<commit_message>
Updated econ paper for sharing
</commit_message>
<xml_diff>
--- a/ECO 3930 ~ Contemporary Economics/Final Paper/FinalPaper.pptx
+++ b/ECO 3930 ~ Contemporary Economics/Final Paper/FinalPaper.pptx
@@ -8,42 +8,34 @@
     <p:sldId id="256" r:id="rId2"/>
     <p:sldId id="257" r:id="rId3"/>
     <p:sldId id="258" r:id="rId4"/>
-    <p:sldId id="259" r:id="rId5"/>
-    <p:sldId id="260" r:id="rId6"/>
-    <p:sldId id="293" r:id="rId7"/>
-    <p:sldId id="263" r:id="rId8"/>
-    <p:sldId id="264" r:id="rId9"/>
-    <p:sldId id="266" r:id="rId10"/>
-    <p:sldId id="265" r:id="rId11"/>
-    <p:sldId id="267" r:id="rId12"/>
-    <p:sldId id="280" r:id="rId13"/>
-    <p:sldId id="268" r:id="rId14"/>
-    <p:sldId id="269" r:id="rId15"/>
-    <p:sldId id="270" r:id="rId16"/>
-    <p:sldId id="282" r:id="rId17"/>
-    <p:sldId id="271" r:id="rId18"/>
-    <p:sldId id="281" r:id="rId19"/>
-    <p:sldId id="272" r:id="rId20"/>
-    <p:sldId id="273" r:id="rId21"/>
-    <p:sldId id="274" r:id="rId22"/>
-    <p:sldId id="275" r:id="rId23"/>
-    <p:sldId id="279" r:id="rId24"/>
-    <p:sldId id="276" r:id="rId25"/>
-    <p:sldId id="277" r:id="rId26"/>
-    <p:sldId id="278" r:id="rId27"/>
-    <p:sldId id="294" r:id="rId28"/>
-    <p:sldId id="295" r:id="rId29"/>
-    <p:sldId id="296" r:id="rId30"/>
-    <p:sldId id="284" r:id="rId31"/>
-    <p:sldId id="285" r:id="rId32"/>
-    <p:sldId id="286" r:id="rId33"/>
-    <p:sldId id="287" r:id="rId34"/>
-    <p:sldId id="288" r:id="rId35"/>
-    <p:sldId id="292" r:id="rId36"/>
-    <p:sldId id="289" r:id="rId37"/>
-    <p:sldId id="290" r:id="rId38"/>
-    <p:sldId id="291" r:id="rId39"/>
-    <p:sldId id="298" r:id="rId40"/>
+    <p:sldId id="299" r:id="rId5"/>
+    <p:sldId id="259" r:id="rId6"/>
+    <p:sldId id="260" r:id="rId7"/>
+    <p:sldId id="293" r:id="rId8"/>
+    <p:sldId id="263" r:id="rId9"/>
+    <p:sldId id="264" r:id="rId10"/>
+    <p:sldId id="266" r:id="rId11"/>
+    <p:sldId id="265" r:id="rId12"/>
+    <p:sldId id="267" r:id="rId13"/>
+    <p:sldId id="280" r:id="rId14"/>
+    <p:sldId id="268" r:id="rId15"/>
+    <p:sldId id="269" r:id="rId16"/>
+    <p:sldId id="270" r:id="rId17"/>
+    <p:sldId id="282" r:id="rId18"/>
+    <p:sldId id="271" r:id="rId19"/>
+    <p:sldId id="281" r:id="rId20"/>
+    <p:sldId id="272" r:id="rId21"/>
+    <p:sldId id="273" r:id="rId22"/>
+    <p:sldId id="274" r:id="rId23"/>
+    <p:sldId id="275" r:id="rId24"/>
+    <p:sldId id="279" r:id="rId25"/>
+    <p:sldId id="276" r:id="rId26"/>
+    <p:sldId id="277" r:id="rId27"/>
+    <p:sldId id="278" r:id="rId28"/>
+    <p:sldId id="294" r:id="rId29"/>
+    <p:sldId id="295" r:id="rId30"/>
+    <p:sldId id="296" r:id="rId31"/>
+    <p:sldId id="298" r:id="rId32"/>
   </p:sldIdLst>
   <p:sldSz cx="12192000" cy="6858000"/>
   <p:notesSz cx="6858000" cy="9144000"/>
@@ -7498,7 +7490,7 @@
             <a:fld id="{9334D819-9F07-4261-B09B-9E467E5D9002}" type="datetimeFigureOut">
               <a:rPr lang="en-US" smtClean="0"/>
               <a:pPr/>
-              <a:t>12/15/21</a:t>
+              <a:t>12/21/21</a:t>
             </a:fld>
             <a:endParaRPr lang="en-US"/>
           </a:p>
@@ -7667,7 +7659,7 @@
           <a:p>
             <a:fld id="{9334D819-9F07-4261-B09B-9E467E5D9002}" type="datetimeFigureOut">
               <a:rPr lang="en-US" smtClean="0"/>
-              <a:t>12/15/21</a:t>
+              <a:t>12/21/21</a:t>
             </a:fld>
             <a:endParaRPr lang="en-US"/>
           </a:p>
@@ -7845,7 +7837,7 @@
           <a:p>
             <a:fld id="{9334D819-9F07-4261-B09B-9E467E5D9002}" type="datetimeFigureOut">
               <a:rPr lang="en-US" smtClean="0"/>
-              <a:t>12/15/21</a:t>
+              <a:t>12/21/21</a:t>
             </a:fld>
             <a:endParaRPr lang="en-US"/>
           </a:p>
@@ -8013,7 +8005,7 @@
           <a:p>
             <a:fld id="{9334D819-9F07-4261-B09B-9E467E5D9002}" type="datetimeFigureOut">
               <a:rPr lang="en-US" smtClean="0"/>
-              <a:t>12/15/21</a:t>
+              <a:t>12/21/21</a:t>
             </a:fld>
             <a:endParaRPr lang="en-US"/>
           </a:p>
@@ -8281,7 +8273,7 @@
             <a:fld id="{9334D819-9F07-4261-B09B-9E467E5D9002}" type="datetimeFigureOut">
               <a:rPr lang="en-US" smtClean="0"/>
               <a:pPr/>
-              <a:t>12/15/21</a:t>
+              <a:t>12/21/21</a:t>
             </a:fld>
             <a:endParaRPr lang="en-US"/>
           </a:p>
@@ -8511,7 +8503,7 @@
           <a:p>
             <a:fld id="{9334D819-9F07-4261-B09B-9E467E5D9002}" type="datetimeFigureOut">
               <a:rPr lang="en-US" smtClean="0"/>
-              <a:t>12/15/21</a:t>
+              <a:t>12/21/21</a:t>
             </a:fld>
             <a:endParaRPr lang="en-US"/>
           </a:p>
@@ -8874,7 +8866,7 @@
             <a:fld id="{9334D819-9F07-4261-B09B-9E467E5D9002}" type="datetimeFigureOut">
               <a:rPr lang="en-US" smtClean="0"/>
               <a:pPr/>
-              <a:t>12/15/21</a:t>
+              <a:t>12/21/21</a:t>
             </a:fld>
             <a:endParaRPr lang="en-US"/>
           </a:p>
@@ -9014,7 +9006,7 @@
           <a:p>
             <a:fld id="{9334D819-9F07-4261-B09B-9E467E5D9002}" type="datetimeFigureOut">
               <a:rPr lang="en-US" smtClean="0"/>
-              <a:t>12/15/21</a:t>
+              <a:t>12/21/21</a:t>
             </a:fld>
             <a:endParaRPr lang="en-US"/>
           </a:p>
@@ -9109,7 +9101,7 @@
           <a:p>
             <a:fld id="{9334D819-9F07-4261-B09B-9E467E5D9002}" type="datetimeFigureOut">
               <a:rPr lang="en-US" smtClean="0"/>
-              <a:t>12/15/21</a:t>
+              <a:t>12/21/21</a:t>
             </a:fld>
             <a:endParaRPr lang="en-US"/>
           </a:p>
@@ -9464,7 +9456,7 @@
           <a:p>
             <a:fld id="{9334D819-9F07-4261-B09B-9E467E5D9002}" type="datetimeFigureOut">
               <a:rPr lang="en-US" smtClean="0"/>
-              <a:t>12/15/21</a:t>
+              <a:t>12/21/21</a:t>
             </a:fld>
             <a:endParaRPr lang="en-US"/>
           </a:p>
@@ -9824,7 +9816,7 @@
           <a:p>
             <a:fld id="{9334D819-9F07-4261-B09B-9E467E5D9002}" type="datetimeFigureOut">
               <a:rPr lang="en-US" smtClean="0"/>
-              <a:t>12/15/21</a:t>
+              <a:t>12/21/21</a:t>
             </a:fld>
             <a:endParaRPr lang="en-US"/>
           </a:p>
@@ -10065,7 +10057,7 @@
             <a:fld id="{9334D819-9F07-4261-B09B-9E467E5D9002}" type="datetimeFigureOut">
               <a:rPr lang="en-US" smtClean="0"/>
               <a:pPr/>
-              <a:t>12/15/21</a:t>
+              <a:t>12/21/21</a:t>
             </a:fld>
             <a:endParaRPr lang="en-US"/>
           </a:p>
@@ -10874,6 +10866,214 @@
       </p:grpSpPr>
       <p:sp>
         <p:nvSpPr>
+          <p:cNvPr id="19" name="Rectangle 18">
+            <a:extLst>
+              <a:ext uri="{FF2B5EF4-FFF2-40B4-BE49-F238E27FC236}">
+                <a16:creationId xmlns:a16="http://schemas.microsoft.com/office/drawing/2014/main" id="{E9F26AF7-9AC1-49A4-8F89-2C63E1C0A0BB}"/>
+              </a:ext>
+              <a:ext uri="{C183D7F6-B498-43B3-948B-1728B52AA6E4}">
+                <adec:decorative xmlns:adec="http://schemas.microsoft.com/office/drawing/2017/decorative" val="1"/>
+              </a:ext>
+            </a:extLst>
+          </p:cNvPr>
+          <p:cNvSpPr>
+            <a:spLocks noGrp="1" noRot="1" noChangeAspect="1" noMove="1" noResize="1" noEditPoints="1" noAdjustHandles="1" noChangeArrowheads="1" noChangeShapeType="1" noTextEdit="1"/>
+          </p:cNvSpPr>
+          <p:nvPr>
+            <p:extLst>
+              <p:ext uri="{386F3935-93C4-4BCD-93E2-E3B085C9AB24}">
+                <p16:designElem xmlns:p16="http://schemas.microsoft.com/office/powerpoint/2015/main" val="1"/>
+              </p:ext>
+            </p:extLst>
+          </p:nvPr>
+        </p:nvSpPr>
+        <p:spPr>
+          <a:xfrm>
+            <a:off x="0" y="-2"/>
+            <a:ext cx="12192000" cy="4918511"/>
+          </a:xfrm>
+          <a:prstGeom prst="rect">
+            <a:avLst/>
+          </a:prstGeom>
+          <a:solidFill>
+            <a:srgbClr val="FFFFFF"/>
+          </a:solidFill>
+          <a:ln>
+            <a:noFill/>
+          </a:ln>
+        </p:spPr>
+        <p:style>
+          <a:lnRef idx="2">
+            <a:schemeClr val="accent1">
+              <a:shade val="50000"/>
+            </a:schemeClr>
+          </a:lnRef>
+          <a:fillRef idx="1">
+            <a:schemeClr val="accent1"/>
+          </a:fillRef>
+          <a:effectRef idx="0">
+            <a:schemeClr val="accent1"/>
+          </a:effectRef>
+          <a:fontRef idx="minor">
+            <a:schemeClr val="lt1"/>
+          </a:fontRef>
+        </p:style>
+        <p:txBody>
+          <a:bodyPr rtlCol="0" anchor="ctr"/>
+          <a:lstStyle/>
+          <a:p>
+            <a:pPr algn="ctr"/>
+            <a:endParaRPr lang="en-US"/>
+          </a:p>
+        </p:txBody>
+      </p:sp>
+      <p:sp>
+        <p:nvSpPr>
+          <p:cNvPr id="2" name="Title 1">
+            <a:extLst>
+              <a:ext uri="{FF2B5EF4-FFF2-40B4-BE49-F238E27FC236}">
+                <a16:creationId xmlns:a16="http://schemas.microsoft.com/office/drawing/2014/main" id="{D16EEA7B-B04A-7E4C-A31A-11097DAFF2F2}"/>
+              </a:ext>
+            </a:extLst>
+          </p:cNvPr>
+          <p:cNvSpPr>
+            <a:spLocks noGrp="1"/>
+          </p:cNvSpPr>
+          <p:nvPr>
+            <p:ph type="title"/>
+          </p:nvPr>
+        </p:nvSpPr>
+        <p:spPr>
+          <a:xfrm>
+            <a:off x="1600200" y="4269282"/>
+            <a:ext cx="8991600" cy="1264762"/>
+          </a:xfrm>
+        </p:spPr>
+        <p:txBody>
+          <a:bodyPr vert="horz" lIns="274320" tIns="182880" rIns="274320" bIns="182880" rtlCol="0" anchor="ctr" anchorCtr="1">
+            <a:normAutofit/>
+          </a:bodyPr>
+          <a:lstStyle/>
+          <a:p>
+            <a:r>
+              <a:rPr lang="en-US" sz="3200"/>
+              <a:t>This is Gus taking a crash course in stats 1 from dr bunn</a:t>
+            </a:r>
+          </a:p>
+        </p:txBody>
+      </p:sp>
+      <p:pic>
+        <p:nvPicPr>
+          <p:cNvPr id="13" name="Graphic 12" descr="Crying face outline with solid fill">
+            <a:extLst>
+              <a:ext uri="{FF2B5EF4-FFF2-40B4-BE49-F238E27FC236}">
+                <a16:creationId xmlns:a16="http://schemas.microsoft.com/office/drawing/2014/main" id="{F658A221-0FFC-1C4F-90A0-669CDD0A7708}"/>
+              </a:ext>
+            </a:extLst>
+          </p:cNvPr>
+          <p:cNvPicPr>
+            <a:picLocks noChangeAspect="1"/>
+          </p:cNvPicPr>
+          <p:nvPr/>
+        </p:nvPicPr>
+        <p:blipFill>
+          <a:blip r:embed="rId2">
+            <a:extLst>
+              <a:ext uri="{96DAC541-7B7A-43D3-8B79-37D633B846F1}">
+                <asvg:svgBlip xmlns:asvg="http://schemas.microsoft.com/office/drawing/2016/SVG/main" r:embed="rId3"/>
+              </a:ext>
+            </a:extLst>
+          </a:blip>
+          <a:srcRect/>
+          <a:stretch/>
+        </p:blipFill>
+        <p:spPr>
+          <a:xfrm>
+            <a:off x="2794692" y="483987"/>
+            <a:ext cx="3301307" cy="3301307"/>
+          </a:xfrm>
+          <a:prstGeom prst="rect">
+            <a:avLst/>
+          </a:prstGeom>
+        </p:spPr>
+      </p:pic>
+      <p:pic>
+        <p:nvPicPr>
+          <p:cNvPr id="7" name="Content Placeholder 6" descr="Teacher with solid fill">
+            <a:extLst>
+              <a:ext uri="{FF2B5EF4-FFF2-40B4-BE49-F238E27FC236}">
+                <a16:creationId xmlns:a16="http://schemas.microsoft.com/office/drawing/2014/main" id="{ECD0ACE1-D6CC-BD4E-AA71-2E3B92E1C3C5}"/>
+              </a:ext>
+            </a:extLst>
+          </p:cNvPr>
+          <p:cNvPicPr>
+            <a:picLocks noGrp="1" noChangeAspect="1"/>
+          </p:cNvPicPr>
+          <p:nvPr>
+            <p:ph idx="1"/>
+          </p:nvPr>
+        </p:nvPicPr>
+        <p:blipFill>
+          <a:blip r:embed="rId4">
+            <a:extLst>
+              <a:ext uri="{96DAC541-7B7A-43D3-8B79-37D633B846F1}">
+                <asvg:svgBlip xmlns:asvg="http://schemas.microsoft.com/office/drawing/2016/SVG/main" r:embed="rId5"/>
+              </a:ext>
+            </a:extLst>
+          </a:blip>
+          <a:srcRect/>
+          <a:stretch/>
+        </p:blipFill>
+        <p:spPr>
+          <a:xfrm>
+            <a:off x="6338315" y="587858"/>
+            <a:ext cx="3301307" cy="3301307"/>
+          </a:xfrm>
+          <a:prstGeom prst="rect">
+            <a:avLst/>
+          </a:prstGeom>
+        </p:spPr>
+      </p:pic>
+    </p:spTree>
+    <p:extLst>
+      <p:ext uri="{BB962C8B-B14F-4D97-AF65-F5344CB8AC3E}">
+        <p14:creationId xmlns:p14="http://schemas.microsoft.com/office/powerpoint/2010/main" val="1071330444"/>
+      </p:ext>
+    </p:extLst>
+  </p:cSld>
+  <p:clrMapOvr>
+    <a:masterClrMapping/>
+  </p:clrMapOvr>
+</p:sld>
+</file>
+
+<file path=ppt/slides/slide11.xml><?xml version="1.0" encoding="utf-8"?>
+<p:sld xmlns:a="http://schemas.openxmlformats.org/drawingml/2006/main" xmlns:r="http://schemas.openxmlformats.org/officeDocument/2006/relationships" xmlns:p="http://schemas.openxmlformats.org/presentationml/2006/main">
+  <p:cSld>
+    <p:bg>
+      <p:bgPr>
+        <a:solidFill>
+          <a:schemeClr val="accent2"/>
+        </a:solidFill>
+        <a:effectLst/>
+      </p:bgPr>
+    </p:bg>
+    <p:spTree>
+      <p:nvGrpSpPr>
+        <p:cNvPr id="1" name=""/>
+        <p:cNvGrpSpPr/>
+        <p:nvPr/>
+      </p:nvGrpSpPr>
+      <p:grpSpPr>
+        <a:xfrm>
+          <a:off x="0" y="0"/>
+          <a:ext cx="0" cy="0"/>
+          <a:chOff x="0" y="0"/>
+          <a:chExt cx="0" cy="0"/>
+        </a:xfrm>
+      </p:grpSpPr>
+      <p:sp>
+        <p:nvSpPr>
           <p:cNvPr id="24" name="Rectangle 23">
             <a:extLst>
               <a:ext uri="{FF2B5EF4-FFF2-40B4-BE49-F238E27FC236}">
@@ -11053,7 +11253,7 @@
 </p:sld>
 </file>
 
-<file path=ppt/slides/slide11.xml><?xml version="1.0" encoding="utf-8"?>
+<file path=ppt/slides/slide12.xml><?xml version="1.0" encoding="utf-8"?>
 <p:sld xmlns:a="http://schemas.openxmlformats.org/drawingml/2006/main" xmlns:r="http://schemas.openxmlformats.org/officeDocument/2006/relationships" xmlns:p="http://schemas.openxmlformats.org/presentationml/2006/main">
   <p:cSld>
     <p:spTree>
@@ -11136,7 +11336,7 @@
 </p:sld>
 </file>
 
-<file path=ppt/slides/slide12.xml><?xml version="1.0" encoding="utf-8"?>
+<file path=ppt/slides/slide13.xml><?xml version="1.0" encoding="utf-8"?>
 <p:sld xmlns:a="http://schemas.openxmlformats.org/drawingml/2006/main" xmlns:r="http://schemas.openxmlformats.org/officeDocument/2006/relationships" xmlns:p="http://schemas.openxmlformats.org/presentationml/2006/main">
   <p:cSld>
     <p:spTree>
@@ -11222,7 +11422,7 @@
 </p:sld>
 </file>
 
-<file path=ppt/slides/slide13.xml><?xml version="1.0" encoding="utf-8"?>
+<file path=ppt/slides/slide14.xml><?xml version="1.0" encoding="utf-8"?>
 <p:sld xmlns:a="http://schemas.openxmlformats.org/drawingml/2006/main" xmlns:r="http://schemas.openxmlformats.org/officeDocument/2006/relationships" xmlns:p="http://schemas.openxmlformats.org/presentationml/2006/main">
   <p:cSld>
     <p:spTree>
@@ -11311,7 +11511,7 @@
 </p:sld>
 </file>
 
-<file path=ppt/slides/slide14.xml><?xml version="1.0" encoding="utf-8"?>
+<file path=ppt/slides/slide15.xml><?xml version="1.0" encoding="utf-8"?>
 <p:sld xmlns:a="http://schemas.openxmlformats.org/drawingml/2006/main" xmlns:r="http://schemas.openxmlformats.org/officeDocument/2006/relationships" xmlns:p="http://schemas.openxmlformats.org/presentationml/2006/main">
   <p:cSld>
     <p:bg>
@@ -11590,7 +11790,7 @@
 </p:sld>
 </file>
 
-<file path=ppt/slides/slide15.xml><?xml version="1.0" encoding="utf-8"?>
+<file path=ppt/slides/slide16.xml><?xml version="1.0" encoding="utf-8"?>
 <p:sld xmlns:a="http://schemas.openxmlformats.org/drawingml/2006/main" xmlns:r="http://schemas.openxmlformats.org/officeDocument/2006/relationships" xmlns:p="http://schemas.openxmlformats.org/presentationml/2006/main">
   <p:cSld>
     <p:spTree>
@@ -12243,7 +12443,7 @@
 </p:sld>
 </file>
 
-<file path=ppt/slides/slide16.xml><?xml version="1.0" encoding="utf-8"?>
+<file path=ppt/slides/slide17.xml><?xml version="1.0" encoding="utf-8"?>
 <p:sld xmlns:a="http://schemas.openxmlformats.org/drawingml/2006/main" xmlns:r="http://schemas.openxmlformats.org/officeDocument/2006/relationships" xmlns:p="http://schemas.openxmlformats.org/presentationml/2006/main">
   <p:cSld>
     <p:spTree>
@@ -12326,7 +12526,7 @@
 </p:sld>
 </file>
 
-<file path=ppt/slides/slide17.xml><?xml version="1.0" encoding="utf-8"?>
+<file path=ppt/slides/slide18.xml><?xml version="1.0" encoding="utf-8"?>
 <p:sld xmlns:a="http://schemas.openxmlformats.org/drawingml/2006/main" xmlns:r="http://schemas.openxmlformats.org/officeDocument/2006/relationships" xmlns:p="http://schemas.openxmlformats.org/presentationml/2006/main">
   <p:cSld>
     <p:spTree>
@@ -12416,7 +12616,7 @@
 </p:sld>
 </file>
 
-<file path=ppt/slides/slide18.xml><?xml version="1.0" encoding="utf-8"?>
+<file path=ppt/slides/slide19.xml><?xml version="1.0" encoding="utf-8"?>
 <p:sld xmlns:a="http://schemas.openxmlformats.org/drawingml/2006/main" xmlns:r="http://schemas.openxmlformats.org/officeDocument/2006/relationships" xmlns:p="http://schemas.openxmlformats.org/presentationml/2006/main">
   <p:cSld>
     <p:spTree>
@@ -12499,95 +12699,6 @@
     <p:extLst>
       <p:ext uri="{BB962C8B-B14F-4D97-AF65-F5344CB8AC3E}">
         <p14:creationId xmlns:p14="http://schemas.microsoft.com/office/powerpoint/2010/main" val="1966799527"/>
-      </p:ext>
-    </p:extLst>
-  </p:cSld>
-  <p:clrMapOvr>
-    <a:masterClrMapping/>
-  </p:clrMapOvr>
-</p:sld>
-</file>
-
-<file path=ppt/slides/slide19.xml><?xml version="1.0" encoding="utf-8"?>
-<p:sld xmlns:a="http://schemas.openxmlformats.org/drawingml/2006/main" xmlns:r="http://schemas.openxmlformats.org/officeDocument/2006/relationships" xmlns:p="http://schemas.openxmlformats.org/presentationml/2006/main">
-  <p:cSld>
-    <p:spTree>
-      <p:nvGrpSpPr>
-        <p:cNvPr id="1" name=""/>
-        <p:cNvGrpSpPr/>
-        <p:nvPr/>
-      </p:nvGrpSpPr>
-      <p:grpSpPr>
-        <a:xfrm>
-          <a:off x="0" y="0"/>
-          <a:ext cx="0" cy="0"/>
-          <a:chOff x="0" y="0"/>
-          <a:chExt cx="0" cy="0"/>
-        </a:xfrm>
-      </p:grpSpPr>
-      <p:sp>
-        <p:nvSpPr>
-          <p:cNvPr id="2" name="Title 1">
-            <a:extLst>
-              <a:ext uri="{FF2B5EF4-FFF2-40B4-BE49-F238E27FC236}">
-                <a16:creationId xmlns:a16="http://schemas.microsoft.com/office/drawing/2014/main" id="{D83CAD9B-F061-F643-8C6B-820A7957399C}"/>
-              </a:ext>
-            </a:extLst>
-          </p:cNvPr>
-          <p:cNvSpPr>
-            <a:spLocks noGrp="1"/>
-          </p:cNvSpPr>
-          <p:nvPr>
-            <p:ph type="title"/>
-          </p:nvPr>
-        </p:nvSpPr>
-        <p:spPr/>
-        <p:txBody>
-          <a:bodyPr/>
-          <a:lstStyle/>
-          <a:p>
-            <a:r>
-              <a:rPr lang="en-US"/>
-              <a:t>A one-on-one tutoring model</a:t>
-            </a:r>
-          </a:p>
-        </p:txBody>
-      </p:sp>
-      <p:graphicFrame>
-        <p:nvGraphicFramePr>
-          <p:cNvPr id="6" name="Content Placeholder 5">
-            <a:extLst>
-              <a:ext uri="{FF2B5EF4-FFF2-40B4-BE49-F238E27FC236}">
-                <a16:creationId xmlns:a16="http://schemas.microsoft.com/office/drawing/2014/main" id="{48A514D0-910D-034D-A1F5-EA1374BE8E63}"/>
-              </a:ext>
-            </a:extLst>
-          </p:cNvPr>
-          <p:cNvGraphicFramePr>
-            <a:graphicFrameLocks noGrp="1"/>
-          </p:cNvGraphicFramePr>
-          <p:nvPr>
-            <p:ph idx="1"/>
-            <p:extLst>
-              <p:ext uri="{D42A27DB-BD31-4B8C-83A1-F6EECF244321}">
-                <p14:modId xmlns:p14="http://schemas.microsoft.com/office/powerpoint/2010/main" val="2535562213"/>
-              </p:ext>
-            </p:extLst>
-          </p:nvPr>
-        </p:nvGraphicFramePr>
-        <p:xfrm>
-          <a:off x="2230438" y="2638425"/>
-          <a:ext cx="7731125" cy="3101975"/>
-        </p:xfrm>
-        <a:graphic>
-          <a:graphicData uri="http://schemas.openxmlformats.org/drawingml/2006/diagram">
-            <dgm:relIds xmlns:dgm="http://schemas.openxmlformats.org/drawingml/2006/diagram" xmlns:r="http://schemas.openxmlformats.org/officeDocument/2006/relationships" r:dm="rId2" r:lo="rId3" r:qs="rId4" r:cs="rId5"/>
-          </a:graphicData>
-        </a:graphic>
-      </p:graphicFrame>
-    </p:spTree>
-    <p:extLst>
-      <p:ext uri="{BB962C8B-B14F-4D97-AF65-F5344CB8AC3E}">
-        <p14:creationId xmlns:p14="http://schemas.microsoft.com/office/powerpoint/2010/main" val="1228659915"/>
       </p:ext>
     </p:extLst>
   </p:cSld>
@@ -12683,6 +12794,95 @@
 </file>
 
 <file path=ppt/slides/slide20.xml><?xml version="1.0" encoding="utf-8"?>
+<p:sld xmlns:a="http://schemas.openxmlformats.org/drawingml/2006/main" xmlns:r="http://schemas.openxmlformats.org/officeDocument/2006/relationships" xmlns:p="http://schemas.openxmlformats.org/presentationml/2006/main">
+  <p:cSld>
+    <p:spTree>
+      <p:nvGrpSpPr>
+        <p:cNvPr id="1" name=""/>
+        <p:cNvGrpSpPr/>
+        <p:nvPr/>
+      </p:nvGrpSpPr>
+      <p:grpSpPr>
+        <a:xfrm>
+          <a:off x="0" y="0"/>
+          <a:ext cx="0" cy="0"/>
+          <a:chOff x="0" y="0"/>
+          <a:chExt cx="0" cy="0"/>
+        </a:xfrm>
+      </p:grpSpPr>
+      <p:sp>
+        <p:nvSpPr>
+          <p:cNvPr id="2" name="Title 1">
+            <a:extLst>
+              <a:ext uri="{FF2B5EF4-FFF2-40B4-BE49-F238E27FC236}">
+                <a16:creationId xmlns:a16="http://schemas.microsoft.com/office/drawing/2014/main" id="{D83CAD9B-F061-F643-8C6B-820A7957399C}"/>
+              </a:ext>
+            </a:extLst>
+          </p:cNvPr>
+          <p:cNvSpPr>
+            <a:spLocks noGrp="1"/>
+          </p:cNvSpPr>
+          <p:nvPr>
+            <p:ph type="title"/>
+          </p:nvPr>
+        </p:nvSpPr>
+        <p:spPr/>
+        <p:txBody>
+          <a:bodyPr/>
+          <a:lstStyle/>
+          <a:p>
+            <a:r>
+              <a:rPr lang="en-US"/>
+              <a:t>A one-on-one tutoring model</a:t>
+            </a:r>
+          </a:p>
+        </p:txBody>
+      </p:sp>
+      <p:graphicFrame>
+        <p:nvGraphicFramePr>
+          <p:cNvPr id="6" name="Content Placeholder 5">
+            <a:extLst>
+              <a:ext uri="{FF2B5EF4-FFF2-40B4-BE49-F238E27FC236}">
+                <a16:creationId xmlns:a16="http://schemas.microsoft.com/office/drawing/2014/main" id="{48A514D0-910D-034D-A1F5-EA1374BE8E63}"/>
+              </a:ext>
+            </a:extLst>
+          </p:cNvPr>
+          <p:cNvGraphicFramePr>
+            <a:graphicFrameLocks noGrp="1"/>
+          </p:cNvGraphicFramePr>
+          <p:nvPr>
+            <p:ph idx="1"/>
+            <p:extLst>
+              <p:ext uri="{D42A27DB-BD31-4B8C-83A1-F6EECF244321}">
+                <p14:modId xmlns:p14="http://schemas.microsoft.com/office/powerpoint/2010/main" val="2535562213"/>
+              </p:ext>
+            </p:extLst>
+          </p:nvPr>
+        </p:nvGraphicFramePr>
+        <p:xfrm>
+          <a:off x="2230438" y="2638425"/>
+          <a:ext cx="7731125" cy="3101975"/>
+        </p:xfrm>
+        <a:graphic>
+          <a:graphicData uri="http://schemas.openxmlformats.org/drawingml/2006/diagram">
+            <dgm:relIds xmlns:dgm="http://schemas.openxmlformats.org/drawingml/2006/diagram" xmlns:r="http://schemas.openxmlformats.org/officeDocument/2006/relationships" r:dm="rId2" r:lo="rId3" r:qs="rId4" r:cs="rId5"/>
+          </a:graphicData>
+        </a:graphic>
+      </p:graphicFrame>
+    </p:spTree>
+    <p:extLst>
+      <p:ext uri="{BB962C8B-B14F-4D97-AF65-F5344CB8AC3E}">
+        <p14:creationId xmlns:p14="http://schemas.microsoft.com/office/powerpoint/2010/main" val="1228659915"/>
+      </p:ext>
+    </p:extLst>
+  </p:cSld>
+  <p:clrMapOvr>
+    <a:masterClrMapping/>
+  </p:clrMapOvr>
+</p:sld>
+</file>
+
+<file path=ppt/slides/slide21.xml><?xml version="1.0" encoding="utf-8"?>
 <p:sld xmlns:a="http://schemas.openxmlformats.org/drawingml/2006/main" xmlns:r="http://schemas.openxmlformats.org/officeDocument/2006/relationships" xmlns:p="http://schemas.openxmlformats.org/presentationml/2006/main">
   <p:cSld>
     <p:spTree>
@@ -12835,7 +13035,7 @@
 </p:sld>
 </file>
 
-<file path=ppt/slides/slide21.xml><?xml version="1.0" encoding="utf-8"?>
+<file path=ppt/slides/slide22.xml><?xml version="1.0" encoding="utf-8"?>
 <p:sld xmlns:a="http://schemas.openxmlformats.org/drawingml/2006/main" xmlns:r="http://schemas.openxmlformats.org/officeDocument/2006/relationships" xmlns:p="http://schemas.openxmlformats.org/presentationml/2006/main">
   <p:cSld>
     <p:spTree>
@@ -13127,7 +13327,7 @@
 </p:sld>
 </file>
 
-<file path=ppt/slides/slide22.xml><?xml version="1.0" encoding="utf-8"?>
+<file path=ppt/slides/slide23.xml><?xml version="1.0" encoding="utf-8"?>
 <p:sld xmlns:a="http://schemas.openxmlformats.org/drawingml/2006/main" xmlns:r="http://schemas.openxmlformats.org/officeDocument/2006/relationships" xmlns:p="http://schemas.openxmlformats.org/presentationml/2006/main">
   <p:cSld>
     <p:spTree>
@@ -13210,7 +13410,7 @@
 </p:sld>
 </file>
 
-<file path=ppt/slides/slide23.xml><?xml version="1.0" encoding="utf-8"?>
+<file path=ppt/slides/slide24.xml><?xml version="1.0" encoding="utf-8"?>
 <p:sld xmlns:a="http://schemas.openxmlformats.org/drawingml/2006/main" xmlns:r="http://schemas.openxmlformats.org/officeDocument/2006/relationships" xmlns:p="http://schemas.openxmlformats.org/presentationml/2006/main">
   <p:cSld>
     <p:spTree>
@@ -13308,7 +13508,7 @@
 </p:sld>
 </file>
 
-<file path=ppt/slides/slide24.xml><?xml version="1.0" encoding="utf-8"?>
+<file path=ppt/slides/slide25.xml><?xml version="1.0" encoding="utf-8"?>
 <p:sld xmlns:a="http://schemas.openxmlformats.org/drawingml/2006/main" xmlns:r="http://schemas.openxmlformats.org/officeDocument/2006/relationships" xmlns:p="http://schemas.openxmlformats.org/presentationml/2006/main">
   <p:cSld>
     <p:spTree>
@@ -13394,7 +13594,7 @@
 </p:sld>
 </file>
 
-<file path=ppt/slides/slide25.xml><?xml version="1.0" encoding="utf-8"?>
+<file path=ppt/slides/slide26.xml><?xml version="1.0" encoding="utf-8"?>
 <p:sld xmlns:a="http://schemas.openxmlformats.org/drawingml/2006/main" xmlns:r="http://schemas.openxmlformats.org/officeDocument/2006/relationships" xmlns:p="http://schemas.openxmlformats.org/presentationml/2006/main">
   <p:cSld>
     <p:spTree>
@@ -13547,7 +13747,7 @@
 </p:sld>
 </file>
 
-<file path=ppt/slides/slide26.xml><?xml version="1.0" encoding="utf-8"?>
+<file path=ppt/slides/slide27.xml><?xml version="1.0" encoding="utf-8"?>
 <p:sld xmlns:a="http://schemas.openxmlformats.org/drawingml/2006/main" xmlns:r="http://schemas.openxmlformats.org/officeDocument/2006/relationships" xmlns:p="http://schemas.openxmlformats.org/presentationml/2006/main">
   <p:cSld>
     <p:spTree>
@@ -13864,7 +14064,7 @@
 </p:sld>
 </file>
 
-<file path=ppt/slides/slide27.xml><?xml version="1.0" encoding="utf-8"?>
+<file path=ppt/slides/slide28.xml><?xml version="1.0" encoding="utf-8"?>
 <p:sld xmlns:a="http://schemas.openxmlformats.org/drawingml/2006/main" xmlns:r="http://schemas.openxmlformats.org/officeDocument/2006/relationships" xmlns:p="http://schemas.openxmlformats.org/presentationml/2006/main">
   <p:cSld>
     <p:spTree>
@@ -13947,7 +14147,7 @@
 </p:sld>
 </file>
 
-<file path=ppt/slides/slide28.xml><?xml version="1.0" encoding="utf-8"?>
+<file path=ppt/slides/slide29.xml><?xml version="1.0" encoding="utf-8"?>
 <p:sld xmlns:a="http://schemas.openxmlformats.org/drawingml/2006/main" xmlns:r="http://schemas.openxmlformats.org/officeDocument/2006/relationships" xmlns:p="http://schemas.openxmlformats.org/presentationml/2006/main">
   <p:cSld>
     <p:spTree>
@@ -14032,98 +14232,6 @@
     <p:extLst>
       <p:ext uri="{BB962C8B-B14F-4D97-AF65-F5344CB8AC3E}">
         <p14:creationId xmlns:p14="http://schemas.microsoft.com/office/powerpoint/2010/main" val="202038066"/>
-      </p:ext>
-    </p:extLst>
-  </p:cSld>
-  <p:clrMapOvr>
-    <a:masterClrMapping/>
-  </p:clrMapOvr>
-</p:sld>
-</file>
-
-<file path=ppt/slides/slide29.xml><?xml version="1.0" encoding="utf-8"?>
-<p:sld xmlns:a="http://schemas.openxmlformats.org/drawingml/2006/main" xmlns:r="http://schemas.openxmlformats.org/officeDocument/2006/relationships" xmlns:p="http://schemas.openxmlformats.org/presentationml/2006/main">
-  <p:cSld>
-    <p:spTree>
-      <p:nvGrpSpPr>
-        <p:cNvPr id="1" name=""/>
-        <p:cNvGrpSpPr/>
-        <p:nvPr/>
-      </p:nvGrpSpPr>
-      <p:grpSpPr>
-        <a:xfrm>
-          <a:off x="0" y="0"/>
-          <a:ext cx="0" cy="0"/>
-          <a:chOff x="0" y="0"/>
-          <a:chExt cx="0" cy="0"/>
-        </a:xfrm>
-      </p:grpSpPr>
-      <p:sp>
-        <p:nvSpPr>
-          <p:cNvPr id="2" name="Title 1">
-            <a:extLst>
-              <a:ext uri="{FF2B5EF4-FFF2-40B4-BE49-F238E27FC236}">
-                <a16:creationId xmlns:a16="http://schemas.microsoft.com/office/drawing/2014/main" id="{5291C0ED-2964-1A4B-959B-C61B363D97E5}"/>
-              </a:ext>
-            </a:extLst>
-          </p:cNvPr>
-          <p:cNvSpPr>
-            <a:spLocks noGrp="1"/>
-          </p:cNvSpPr>
-          <p:nvPr>
-            <p:ph type="title"/>
-          </p:nvPr>
-        </p:nvSpPr>
-        <p:spPr/>
-        <p:txBody>
-          <a:bodyPr/>
-          <a:lstStyle/>
-          <a:p>
-            <a:r>
-              <a:rPr lang="en-US" dirty="0"/>
-              <a:t>A hybrid model is probably best</a:t>
-            </a:r>
-          </a:p>
-        </p:txBody>
-      </p:sp>
-      <p:sp>
-        <p:nvSpPr>
-          <p:cNvPr id="3" name="Content Placeholder 2">
-            <a:extLst>
-              <a:ext uri="{FF2B5EF4-FFF2-40B4-BE49-F238E27FC236}">
-                <a16:creationId xmlns:a16="http://schemas.microsoft.com/office/drawing/2014/main" id="{FE6FFC7F-373E-7847-8C27-741374BBF250}"/>
-              </a:ext>
-            </a:extLst>
-          </p:cNvPr>
-          <p:cNvSpPr>
-            <a:spLocks noGrp="1"/>
-          </p:cNvSpPr>
-          <p:nvPr>
-            <p:ph idx="1"/>
-          </p:nvPr>
-        </p:nvSpPr>
-        <p:spPr/>
-        <p:txBody>
-          <a:bodyPr/>
-          <a:lstStyle/>
-          <a:p>
-            <a:r>
-              <a:rPr lang="en-US" dirty="0"/>
-              <a:t>You get the best parts of group tutoring and one-on-one tutoring</a:t>
-            </a:r>
-          </a:p>
-          <a:p>
-            <a:r>
-              <a:rPr lang="en-US" dirty="0"/>
-              <a:t>It has potential to be at least as efficient as group tutoring</a:t>
-            </a:r>
-          </a:p>
-        </p:txBody>
-      </p:sp>
-    </p:spTree>
-    <p:extLst>
-      <p:ext uri="{BB962C8B-B14F-4D97-AF65-F5344CB8AC3E}">
-        <p14:creationId xmlns:p14="http://schemas.microsoft.com/office/powerpoint/2010/main" val="658621419"/>
       </p:ext>
     </p:extLst>
   </p:cSld>
@@ -14203,25 +14311,25 @@
               <a:buNone/>
             </a:pPr>
             <a:r>
-              <a:rPr lang="en-US"/>
+              <a:rPr lang="en-US" dirty="0"/>
               <a:t>The tutoring system at Florida Poly is bad</a:t>
             </a:r>
           </a:p>
           <a:p>
             <a:r>
-              <a:rPr lang="en-US"/>
+              <a:rPr lang="en-US" dirty="0"/>
               <a:t>Tutors make their own schedules</a:t>
             </a:r>
           </a:p>
           <a:p>
             <a:r>
-              <a:rPr lang="en-US"/>
+              <a:rPr lang="en-US" dirty="0"/>
               <a:t>There is not a tutor for every class</a:t>
             </a:r>
           </a:p>
           <a:p>
             <a:r>
-              <a:rPr lang="en-US"/>
+              <a:rPr lang="en-US" dirty="0"/>
               <a:t>Tutoring sessions can become crowded</a:t>
             </a:r>
           </a:p>
@@ -14241,6 +14349,98 @@
 </file>
 
 <file path=ppt/slides/slide30.xml><?xml version="1.0" encoding="utf-8"?>
+<p:sld xmlns:a="http://schemas.openxmlformats.org/drawingml/2006/main" xmlns:r="http://schemas.openxmlformats.org/officeDocument/2006/relationships" xmlns:p="http://schemas.openxmlformats.org/presentationml/2006/main">
+  <p:cSld>
+    <p:spTree>
+      <p:nvGrpSpPr>
+        <p:cNvPr id="1" name=""/>
+        <p:cNvGrpSpPr/>
+        <p:nvPr/>
+      </p:nvGrpSpPr>
+      <p:grpSpPr>
+        <a:xfrm>
+          <a:off x="0" y="0"/>
+          <a:ext cx="0" cy="0"/>
+          <a:chOff x="0" y="0"/>
+          <a:chExt cx="0" cy="0"/>
+        </a:xfrm>
+      </p:grpSpPr>
+      <p:sp>
+        <p:nvSpPr>
+          <p:cNvPr id="2" name="Title 1">
+            <a:extLst>
+              <a:ext uri="{FF2B5EF4-FFF2-40B4-BE49-F238E27FC236}">
+                <a16:creationId xmlns:a16="http://schemas.microsoft.com/office/drawing/2014/main" id="{5291C0ED-2964-1A4B-959B-C61B363D97E5}"/>
+              </a:ext>
+            </a:extLst>
+          </p:cNvPr>
+          <p:cNvSpPr>
+            <a:spLocks noGrp="1"/>
+          </p:cNvSpPr>
+          <p:nvPr>
+            <p:ph type="title"/>
+          </p:nvPr>
+        </p:nvSpPr>
+        <p:spPr/>
+        <p:txBody>
+          <a:bodyPr/>
+          <a:lstStyle/>
+          <a:p>
+            <a:r>
+              <a:rPr lang="en-US" dirty="0"/>
+              <a:t>A hybrid model is probably best</a:t>
+            </a:r>
+          </a:p>
+        </p:txBody>
+      </p:sp>
+      <p:sp>
+        <p:nvSpPr>
+          <p:cNvPr id="3" name="Content Placeholder 2">
+            <a:extLst>
+              <a:ext uri="{FF2B5EF4-FFF2-40B4-BE49-F238E27FC236}">
+                <a16:creationId xmlns:a16="http://schemas.microsoft.com/office/drawing/2014/main" id="{FE6FFC7F-373E-7847-8C27-741374BBF250}"/>
+              </a:ext>
+            </a:extLst>
+          </p:cNvPr>
+          <p:cNvSpPr>
+            <a:spLocks noGrp="1"/>
+          </p:cNvSpPr>
+          <p:nvPr>
+            <p:ph idx="1"/>
+          </p:nvPr>
+        </p:nvSpPr>
+        <p:spPr/>
+        <p:txBody>
+          <a:bodyPr/>
+          <a:lstStyle/>
+          <a:p>
+            <a:r>
+              <a:rPr lang="en-US" dirty="0"/>
+              <a:t>You get the best parts of group tutoring and one-on-one tutoring</a:t>
+            </a:r>
+          </a:p>
+          <a:p>
+            <a:r>
+              <a:rPr lang="en-US" dirty="0"/>
+              <a:t>It has potential to be at least as efficient as group tutoring</a:t>
+            </a:r>
+          </a:p>
+        </p:txBody>
+      </p:sp>
+    </p:spTree>
+    <p:extLst>
+      <p:ext uri="{BB962C8B-B14F-4D97-AF65-F5344CB8AC3E}">
+        <p14:creationId xmlns:p14="http://schemas.microsoft.com/office/powerpoint/2010/main" val="658621419"/>
+      </p:ext>
+    </p:extLst>
+  </p:cSld>
+  <p:clrMapOvr>
+    <a:masterClrMapping/>
+  </p:clrMapOvr>
+</p:sld>
+</file>
+
+<file path=ppt/slides/slide31.xml><?xml version="1.0" encoding="utf-8"?>
 <p:sld xmlns:a="http://schemas.openxmlformats.org/drawingml/2006/main" xmlns:r="http://schemas.openxmlformats.org/officeDocument/2006/relationships" xmlns:p="http://schemas.openxmlformats.org/presentationml/2006/main">
   <p:cSld>
     <p:bg>
@@ -14358,1490 +14558,6 @@
           <a:p>
             <a:r>
               <a:rPr lang="en-US" sz="3200"/>
-              <a:t>Questions for the audience</a:t>
-            </a:r>
-          </a:p>
-        </p:txBody>
-      </p:sp>
-      <p:sp>
-        <p:nvSpPr>
-          <p:cNvPr id="19" name="Rectangle 18">
-            <a:extLst>
-              <a:ext uri="{FF2B5EF4-FFF2-40B4-BE49-F238E27FC236}">
-                <a16:creationId xmlns:a16="http://schemas.microsoft.com/office/drawing/2014/main" id="{23737A38-06E9-444D-9349-4EA8F3A8C070}"/>
-              </a:ext>
-              <a:ext uri="{C183D7F6-B498-43B3-948B-1728B52AA6E4}">
-                <adec:decorative xmlns:adec="http://schemas.microsoft.com/office/drawing/2017/decorative" val="1"/>
-              </a:ext>
-            </a:extLst>
-          </p:cNvPr>
-          <p:cNvSpPr>
-            <a:spLocks noGrp="1" noRot="1" noChangeAspect="1" noMove="1" noResize="1" noEditPoints="1" noAdjustHandles="1" noChangeArrowheads="1" noChangeShapeType="1" noTextEdit="1"/>
-          </p:cNvSpPr>
-          <p:nvPr>
-            <p:extLst>
-              <p:ext uri="{386F3935-93C4-4BCD-93E2-E3B085C9AB24}">
-                <p16:designElem xmlns:p16="http://schemas.microsoft.com/office/powerpoint/2015/main" val="1"/>
-              </p:ext>
-            </p:extLst>
-          </p:nvPr>
-        </p:nvSpPr>
-        <p:spPr>
-          <a:xfrm>
-            <a:off x="2560320" y="640555"/>
-            <a:ext cx="7071360" cy="3312058"/>
-          </a:xfrm>
-          <a:prstGeom prst="rect">
-            <a:avLst/>
-          </a:prstGeom>
-          <a:noFill/>
-          <a:ln w="31750" cap="sq">
-            <a:solidFill>
-              <a:srgbClr val="FFFFFF"/>
-            </a:solidFill>
-            <a:miter lim="800000"/>
-          </a:ln>
-        </p:spPr>
-        <p:style>
-          <a:lnRef idx="2">
-            <a:schemeClr val="accent1">
-              <a:shade val="50000"/>
-            </a:schemeClr>
-          </a:lnRef>
-          <a:fillRef idx="1">
-            <a:schemeClr val="accent1"/>
-          </a:fillRef>
-          <a:effectRef idx="0">
-            <a:schemeClr val="accent1"/>
-          </a:effectRef>
-          <a:fontRef idx="minor">
-            <a:schemeClr val="lt1"/>
-          </a:fontRef>
-        </p:style>
-        <p:txBody>
-          <a:bodyPr rtlCol="0" anchor="ctr"/>
-          <a:lstStyle/>
-          <a:p>
-            <a:pPr algn="ctr"/>
-            <a:endParaRPr lang="en-US"/>
-          </a:p>
-        </p:txBody>
-      </p:sp>
-      <p:sp>
-        <p:nvSpPr>
-          <p:cNvPr id="21" name="Rectangle 20">
-            <a:extLst>
-              <a:ext uri="{FF2B5EF4-FFF2-40B4-BE49-F238E27FC236}">
-                <a16:creationId xmlns:a16="http://schemas.microsoft.com/office/drawing/2014/main" id="{219FCCB8-5A8A-43BA-B60E-759FC80FF1B0}"/>
-              </a:ext>
-              <a:ext uri="{C183D7F6-B498-43B3-948B-1728B52AA6E4}">
-                <adec:decorative xmlns:adec="http://schemas.microsoft.com/office/drawing/2017/decorative" val="1"/>
-              </a:ext>
-            </a:extLst>
-          </p:cNvPr>
-          <p:cNvSpPr>
-            <a:spLocks noGrp="1" noRot="1" noChangeAspect="1" noMove="1" noResize="1" noEditPoints="1" noAdjustHandles="1" noChangeArrowheads="1" noChangeShapeType="1" noTextEdit="1"/>
-          </p:cNvSpPr>
-          <p:nvPr>
-            <p:extLst>
-              <p:ext uri="{386F3935-93C4-4BCD-93E2-E3B085C9AB24}">
-                <p16:designElem xmlns:p16="http://schemas.microsoft.com/office/powerpoint/2015/main" val="1"/>
-              </p:ext>
-            </p:extLst>
-          </p:nvPr>
-        </p:nvSpPr>
-        <p:spPr>
-          <a:xfrm>
-            <a:off x="2726436" y="806112"/>
-            <a:ext cx="6739128" cy="2980944"/>
-          </a:xfrm>
-          <a:prstGeom prst="rect">
-            <a:avLst/>
-          </a:prstGeom>
-          <a:solidFill>
-            <a:schemeClr val="bg1"/>
-          </a:solidFill>
-          <a:ln>
-            <a:noFill/>
-          </a:ln>
-        </p:spPr>
-        <p:style>
-          <a:lnRef idx="2">
-            <a:schemeClr val="accent1">
-              <a:shade val="50000"/>
-            </a:schemeClr>
-          </a:lnRef>
-          <a:fillRef idx="1">
-            <a:schemeClr val="accent1"/>
-          </a:fillRef>
-          <a:effectRef idx="0">
-            <a:schemeClr val="accent1"/>
-          </a:effectRef>
-          <a:fontRef idx="minor">
-            <a:schemeClr val="lt1"/>
-          </a:fontRef>
-        </p:style>
-        <p:txBody>
-          <a:bodyPr rtlCol="0" anchor="ctr"/>
-          <a:lstStyle/>
-          <a:p>
-            <a:pPr algn="ctr"/>
-            <a:endParaRPr lang="en-US"/>
-          </a:p>
-        </p:txBody>
-      </p:sp>
-      <p:pic>
-        <p:nvPicPr>
-          <p:cNvPr id="7" name="Graphic 6" descr="Classroom">
-            <a:extLst>
-              <a:ext uri="{FF2B5EF4-FFF2-40B4-BE49-F238E27FC236}">
-                <a16:creationId xmlns:a16="http://schemas.microsoft.com/office/drawing/2014/main" id="{8A987D32-717F-41C8-9D04-103B8780B765}"/>
-              </a:ext>
-            </a:extLst>
-          </p:cNvPr>
-          <p:cNvPicPr>
-            <a:picLocks noChangeAspect="1"/>
-          </p:cNvPicPr>
-          <p:nvPr/>
-        </p:nvPicPr>
-        <p:blipFill>
-          <a:blip r:embed="rId2">
-            <a:extLst>
-              <a:ext uri="{28A0092B-C50C-407E-A947-70E740481C1C}">
-                <a14:useLocalDpi xmlns:a14="http://schemas.microsoft.com/office/drawing/2010/main" val="0"/>
-              </a:ext>
-              <a:ext uri="{96DAC541-7B7A-43D3-8B79-37D633B846F1}">
-                <asvg:svgBlip xmlns:asvg="http://schemas.microsoft.com/office/drawing/2016/SVG/main" r:embed="rId3"/>
-              </a:ext>
-            </a:extLst>
-          </a:blip>
-          <a:stretch>
-            <a:fillRect/>
-          </a:stretch>
-        </p:blipFill>
-        <p:spPr>
-          <a:xfrm>
-            <a:off x="4770120" y="970704"/>
-            <a:ext cx="2651760" cy="2651760"/>
-          </a:xfrm>
-          <a:prstGeom prst="rect">
-            <a:avLst/>
-          </a:prstGeom>
-        </p:spPr>
-      </p:pic>
-      <p:pic>
-        <p:nvPicPr>
-          <p:cNvPr id="8" name="Graphic 7" descr="Worried face outline with solid fill">
-            <a:extLst>
-              <a:ext uri="{FF2B5EF4-FFF2-40B4-BE49-F238E27FC236}">
-                <a16:creationId xmlns:a16="http://schemas.microsoft.com/office/drawing/2014/main" id="{A764A6D9-50B9-374C-ACEF-A0C302EFD14A}"/>
-              </a:ext>
-            </a:extLst>
-          </p:cNvPr>
-          <p:cNvPicPr>
-            <a:picLocks noChangeAspect="1"/>
-          </p:cNvPicPr>
-          <p:nvPr/>
-        </p:nvPicPr>
-        <p:blipFill>
-          <a:blip r:embed="rId4">
-            <a:extLst>
-              <a:ext uri="{96DAC541-7B7A-43D3-8B79-37D633B846F1}">
-                <asvg:svgBlip xmlns:asvg="http://schemas.microsoft.com/office/drawing/2016/SVG/main" r:embed="rId5"/>
-              </a:ext>
-            </a:extLst>
-          </a:blip>
-          <a:stretch>
-            <a:fillRect/>
-          </a:stretch>
-        </p:blipFill>
-        <p:spPr>
-          <a:xfrm>
-            <a:off x="5758543" y="2703285"/>
-            <a:ext cx="293915" cy="293915"/>
-          </a:xfrm>
-          <a:prstGeom prst="rect">
-            <a:avLst/>
-          </a:prstGeom>
-        </p:spPr>
-      </p:pic>
-      <p:pic>
-        <p:nvPicPr>
-          <p:cNvPr id="12" name="Graphic 11" descr="Worried face outline with solid fill">
-            <a:extLst>
-              <a:ext uri="{FF2B5EF4-FFF2-40B4-BE49-F238E27FC236}">
-                <a16:creationId xmlns:a16="http://schemas.microsoft.com/office/drawing/2014/main" id="{2461CF88-741D-FF41-A0C9-12F04EB9DA82}"/>
-              </a:ext>
-            </a:extLst>
-          </p:cNvPr>
-          <p:cNvPicPr>
-            <a:picLocks noChangeAspect="1"/>
-          </p:cNvPicPr>
-          <p:nvPr/>
-        </p:nvPicPr>
-        <p:blipFill>
-          <a:blip r:embed="rId4">
-            <a:extLst>
-              <a:ext uri="{96DAC541-7B7A-43D3-8B79-37D633B846F1}">
-                <asvg:svgBlip xmlns:asvg="http://schemas.microsoft.com/office/drawing/2016/SVG/main" r:embed="rId5"/>
-              </a:ext>
-            </a:extLst>
-          </a:blip>
-          <a:stretch>
-            <a:fillRect/>
-          </a:stretch>
-        </p:blipFill>
-        <p:spPr>
-          <a:xfrm>
-            <a:off x="6309360" y="2703285"/>
-            <a:ext cx="293915" cy="293915"/>
-          </a:xfrm>
-          <a:prstGeom prst="rect">
-            <a:avLst/>
-          </a:prstGeom>
-        </p:spPr>
-      </p:pic>
-      <p:pic>
-        <p:nvPicPr>
-          <p:cNvPr id="13" name="Graphic 12" descr="Worried face outline with solid fill">
-            <a:extLst>
-              <a:ext uri="{FF2B5EF4-FFF2-40B4-BE49-F238E27FC236}">
-                <a16:creationId xmlns:a16="http://schemas.microsoft.com/office/drawing/2014/main" id="{31B36BB6-D3CC-4A43-A58A-A116427A4841}"/>
-              </a:ext>
-            </a:extLst>
-          </p:cNvPr>
-          <p:cNvPicPr>
-            <a:picLocks noChangeAspect="1"/>
-          </p:cNvPicPr>
-          <p:nvPr/>
-        </p:nvPicPr>
-        <p:blipFill>
-          <a:blip r:embed="rId4">
-            <a:extLst>
-              <a:ext uri="{96DAC541-7B7A-43D3-8B79-37D633B846F1}">
-                <asvg:svgBlip xmlns:asvg="http://schemas.microsoft.com/office/drawing/2016/SVG/main" r:embed="rId5"/>
-              </a:ext>
-            </a:extLst>
-          </a:blip>
-          <a:stretch>
-            <a:fillRect/>
-          </a:stretch>
-        </p:blipFill>
-        <p:spPr>
-          <a:xfrm>
-            <a:off x="6858000" y="2703285"/>
-            <a:ext cx="293915" cy="293915"/>
-          </a:xfrm>
-          <a:prstGeom prst="rect">
-            <a:avLst/>
-          </a:prstGeom>
-        </p:spPr>
-      </p:pic>
-      <p:pic>
-        <p:nvPicPr>
-          <p:cNvPr id="14" name="Graphic 13" descr="Funny face outline with solid fill">
-            <a:extLst>
-              <a:ext uri="{FF2B5EF4-FFF2-40B4-BE49-F238E27FC236}">
-                <a16:creationId xmlns:a16="http://schemas.microsoft.com/office/drawing/2014/main" id="{4FE597C5-E6E5-3943-B64A-D30EBC9CEF1A}"/>
-              </a:ext>
-            </a:extLst>
-          </p:cNvPr>
-          <p:cNvPicPr>
-            <a:picLocks noChangeAspect="1"/>
-          </p:cNvPicPr>
-          <p:nvPr/>
-        </p:nvPicPr>
-        <p:blipFill>
-          <a:blip r:embed="rId6">
-            <a:extLst>
-              <a:ext uri="{96DAC541-7B7A-43D3-8B79-37D633B846F1}">
-                <asvg:svgBlip xmlns:asvg="http://schemas.microsoft.com/office/drawing/2016/SVG/main" r:embed="rId7"/>
-              </a:ext>
-            </a:extLst>
-          </a:blip>
-          <a:stretch>
-            <a:fillRect/>
-          </a:stretch>
-        </p:blipFill>
-        <p:spPr>
-          <a:xfrm>
-            <a:off x="5156200" y="1485125"/>
-            <a:ext cx="412617" cy="412617"/>
-          </a:xfrm>
-          <a:prstGeom prst="rect">
-            <a:avLst/>
-          </a:prstGeom>
-        </p:spPr>
-      </p:pic>
-    </p:spTree>
-    <p:extLst>
-      <p:ext uri="{BB962C8B-B14F-4D97-AF65-F5344CB8AC3E}">
-        <p14:creationId xmlns:p14="http://schemas.microsoft.com/office/powerpoint/2010/main" val="3434411308"/>
-      </p:ext>
-    </p:extLst>
-  </p:cSld>
-  <p:clrMapOvr>
-    <a:overrideClrMapping bg1="lt1" tx1="dk1" bg2="lt2" tx2="dk2" accent1="accent1" accent2="accent2" accent3="accent3" accent4="accent4" accent5="accent5" accent6="accent6" hlink="hlink" folHlink="folHlink"/>
-  </p:clrMapOvr>
-</p:sld>
-</file>
-
-<file path=ppt/slides/slide31.xml><?xml version="1.0" encoding="utf-8"?>
-<p:sld xmlns:a="http://schemas.openxmlformats.org/drawingml/2006/main" xmlns:r="http://schemas.openxmlformats.org/officeDocument/2006/relationships" xmlns:p="http://schemas.openxmlformats.org/presentationml/2006/main">
-  <p:cSld>
-    <p:spTree>
-      <p:nvGrpSpPr>
-        <p:cNvPr id="1" name=""/>
-        <p:cNvGrpSpPr/>
-        <p:nvPr/>
-      </p:nvGrpSpPr>
-      <p:grpSpPr>
-        <a:xfrm>
-          <a:off x="0" y="0"/>
-          <a:ext cx="0" cy="0"/>
-          <a:chOff x="0" y="0"/>
-          <a:chExt cx="0" cy="0"/>
-        </a:xfrm>
-      </p:grpSpPr>
-      <p:sp>
-        <p:nvSpPr>
-          <p:cNvPr id="2" name="Title 1">
-            <a:extLst>
-              <a:ext uri="{FF2B5EF4-FFF2-40B4-BE49-F238E27FC236}">
-                <a16:creationId xmlns:a16="http://schemas.microsoft.com/office/drawing/2014/main" id="{A2A28E64-187F-BD45-9281-9CD95C95894C}"/>
-              </a:ext>
-            </a:extLst>
-          </p:cNvPr>
-          <p:cNvSpPr>
-            <a:spLocks noGrp="1"/>
-          </p:cNvSpPr>
-          <p:nvPr>
-            <p:ph type="title"/>
-          </p:nvPr>
-        </p:nvSpPr>
-        <p:spPr/>
-        <p:txBody>
-          <a:bodyPr/>
-          <a:lstStyle/>
-          <a:p>
-            <a:r>
-              <a:rPr lang="en-US"/>
-              <a:t>Kori</a:t>
-            </a:r>
-          </a:p>
-        </p:txBody>
-      </p:sp>
-      <p:sp>
-        <p:nvSpPr>
-          <p:cNvPr id="3" name="Content Placeholder 2">
-            <a:extLst>
-              <a:ext uri="{FF2B5EF4-FFF2-40B4-BE49-F238E27FC236}">
-                <a16:creationId xmlns:a16="http://schemas.microsoft.com/office/drawing/2014/main" id="{C850E5F9-5955-E24C-9635-AD064C31AB86}"/>
-              </a:ext>
-            </a:extLst>
-          </p:cNvPr>
-          <p:cNvSpPr>
-            <a:spLocks noGrp="1"/>
-          </p:cNvSpPr>
-          <p:nvPr>
-            <p:ph idx="1"/>
-          </p:nvPr>
-        </p:nvSpPr>
-        <p:spPr/>
-        <p:txBody>
-          <a:bodyPr anchor="ctr"/>
-          <a:lstStyle/>
-          <a:p>
-            <a:pPr marL="0" indent="0" algn="ctr">
-              <a:buNone/>
-            </a:pPr>
-            <a:r>
-              <a:rPr lang="en-US"/>
-              <a:t>Who?</a:t>
-            </a:r>
-            <a:endParaRPr lang="en-US" dirty="0"/>
-          </a:p>
-        </p:txBody>
-      </p:sp>
-    </p:spTree>
-    <p:extLst>
-      <p:ext uri="{BB962C8B-B14F-4D97-AF65-F5344CB8AC3E}">
-        <p14:creationId xmlns:p14="http://schemas.microsoft.com/office/powerpoint/2010/main" val="2376419133"/>
-      </p:ext>
-    </p:extLst>
-  </p:cSld>
-  <p:clrMapOvr>
-    <a:masterClrMapping/>
-  </p:clrMapOvr>
-</p:sld>
-</file>
-
-<file path=ppt/slides/slide32.xml><?xml version="1.0" encoding="utf-8"?>
-<p:sld xmlns:a="http://schemas.openxmlformats.org/drawingml/2006/main" xmlns:r="http://schemas.openxmlformats.org/officeDocument/2006/relationships" xmlns:p="http://schemas.openxmlformats.org/presentationml/2006/main">
-  <p:cSld>
-    <p:spTree>
-      <p:nvGrpSpPr>
-        <p:cNvPr id="1" name=""/>
-        <p:cNvGrpSpPr/>
-        <p:nvPr/>
-      </p:nvGrpSpPr>
-      <p:grpSpPr>
-        <a:xfrm>
-          <a:off x="0" y="0"/>
-          <a:ext cx="0" cy="0"/>
-          <a:chOff x="0" y="0"/>
-          <a:chExt cx="0" cy="0"/>
-        </a:xfrm>
-      </p:grpSpPr>
-      <p:sp>
-        <p:nvSpPr>
-          <p:cNvPr id="2" name="Title 1">
-            <a:extLst>
-              <a:ext uri="{FF2B5EF4-FFF2-40B4-BE49-F238E27FC236}">
-                <a16:creationId xmlns:a16="http://schemas.microsoft.com/office/drawing/2014/main" id="{D2F5178D-2AA9-A44F-AA02-6ACA5360280B}"/>
-              </a:ext>
-            </a:extLst>
-          </p:cNvPr>
-          <p:cNvSpPr>
-            <a:spLocks noGrp="1"/>
-          </p:cNvSpPr>
-          <p:nvPr>
-            <p:ph type="title"/>
-          </p:nvPr>
-        </p:nvSpPr>
-        <p:spPr/>
-        <p:txBody>
-          <a:bodyPr/>
-          <a:lstStyle/>
-          <a:p>
-            <a:r>
-              <a:rPr lang="en-US" dirty="0"/>
-              <a:t>Hailey</a:t>
-            </a:r>
-          </a:p>
-        </p:txBody>
-      </p:sp>
-      <p:sp>
-        <p:nvSpPr>
-          <p:cNvPr id="3" name="Content Placeholder 2">
-            <a:extLst>
-              <a:ext uri="{FF2B5EF4-FFF2-40B4-BE49-F238E27FC236}">
-                <a16:creationId xmlns:a16="http://schemas.microsoft.com/office/drawing/2014/main" id="{A1506D70-5D84-CD48-9F47-57DD4FBD4FB6}"/>
-              </a:ext>
-            </a:extLst>
-          </p:cNvPr>
-          <p:cNvSpPr>
-            <a:spLocks noGrp="1"/>
-          </p:cNvSpPr>
-          <p:nvPr>
-            <p:ph idx="1"/>
-          </p:nvPr>
-        </p:nvSpPr>
-        <p:spPr/>
-        <p:txBody>
-          <a:bodyPr anchor="ctr"/>
-          <a:lstStyle/>
-          <a:p>
-            <a:pPr marL="0" indent="0" algn="ctr">
-              <a:buNone/>
-            </a:pPr>
-            <a:r>
-              <a:rPr lang="en-US"/>
-              <a:t>What?</a:t>
-            </a:r>
-            <a:endParaRPr lang="en-US" dirty="0"/>
-          </a:p>
-        </p:txBody>
-      </p:sp>
-    </p:spTree>
-    <p:extLst>
-      <p:ext uri="{BB962C8B-B14F-4D97-AF65-F5344CB8AC3E}">
-        <p14:creationId xmlns:p14="http://schemas.microsoft.com/office/powerpoint/2010/main" val="3972342060"/>
-      </p:ext>
-    </p:extLst>
-  </p:cSld>
-  <p:clrMapOvr>
-    <a:masterClrMapping/>
-  </p:clrMapOvr>
-</p:sld>
-</file>
-
-<file path=ppt/slides/slide33.xml><?xml version="1.0" encoding="utf-8"?>
-<p:sld xmlns:a="http://schemas.openxmlformats.org/drawingml/2006/main" xmlns:r="http://schemas.openxmlformats.org/officeDocument/2006/relationships" xmlns:p="http://schemas.openxmlformats.org/presentationml/2006/main">
-  <p:cSld>
-    <p:spTree>
-      <p:nvGrpSpPr>
-        <p:cNvPr id="1" name=""/>
-        <p:cNvGrpSpPr/>
-        <p:nvPr/>
-      </p:nvGrpSpPr>
-      <p:grpSpPr>
-        <a:xfrm>
-          <a:off x="0" y="0"/>
-          <a:ext cx="0" cy="0"/>
-          <a:chOff x="0" y="0"/>
-          <a:chExt cx="0" cy="0"/>
-        </a:xfrm>
-      </p:grpSpPr>
-      <p:sp>
-        <p:nvSpPr>
-          <p:cNvPr id="2" name="Title 1">
-            <a:extLst>
-              <a:ext uri="{FF2B5EF4-FFF2-40B4-BE49-F238E27FC236}">
-                <a16:creationId xmlns:a16="http://schemas.microsoft.com/office/drawing/2014/main" id="{D28765AD-8386-C545-934D-9944FDD32F4A}"/>
-              </a:ext>
-            </a:extLst>
-          </p:cNvPr>
-          <p:cNvSpPr>
-            <a:spLocks noGrp="1"/>
-          </p:cNvSpPr>
-          <p:nvPr>
-            <p:ph type="title"/>
-          </p:nvPr>
-        </p:nvSpPr>
-        <p:spPr/>
-        <p:txBody>
-          <a:bodyPr/>
-          <a:lstStyle/>
-          <a:p>
-            <a:r>
-              <a:rPr lang="en-US"/>
-              <a:t>Logan</a:t>
-            </a:r>
-          </a:p>
-        </p:txBody>
-      </p:sp>
-      <p:sp>
-        <p:nvSpPr>
-          <p:cNvPr id="3" name="Content Placeholder 2">
-            <a:extLst>
-              <a:ext uri="{FF2B5EF4-FFF2-40B4-BE49-F238E27FC236}">
-                <a16:creationId xmlns:a16="http://schemas.microsoft.com/office/drawing/2014/main" id="{D94A2D1B-AE13-0D41-9BE0-59FF9CA170B7}"/>
-              </a:ext>
-            </a:extLst>
-          </p:cNvPr>
-          <p:cNvSpPr>
-            <a:spLocks noGrp="1"/>
-          </p:cNvSpPr>
-          <p:nvPr>
-            <p:ph idx="1"/>
-          </p:nvPr>
-        </p:nvSpPr>
-        <p:spPr/>
-        <p:txBody>
-          <a:bodyPr anchor="ctr"/>
-          <a:lstStyle/>
-          <a:p>
-            <a:pPr marL="0" indent="0" algn="ctr">
-              <a:buNone/>
-            </a:pPr>
-            <a:r>
-              <a:rPr lang="en-US"/>
-              <a:t>When?</a:t>
-            </a:r>
-            <a:endParaRPr lang="en-US" dirty="0"/>
-          </a:p>
-        </p:txBody>
-      </p:sp>
-    </p:spTree>
-    <p:extLst>
-      <p:ext uri="{BB962C8B-B14F-4D97-AF65-F5344CB8AC3E}">
-        <p14:creationId xmlns:p14="http://schemas.microsoft.com/office/powerpoint/2010/main" val="2451927483"/>
-      </p:ext>
-    </p:extLst>
-  </p:cSld>
-  <p:clrMapOvr>
-    <a:masterClrMapping/>
-  </p:clrMapOvr>
-</p:sld>
-</file>
-
-<file path=ppt/slides/slide34.xml><?xml version="1.0" encoding="utf-8"?>
-<p:sld xmlns:a="http://schemas.openxmlformats.org/drawingml/2006/main" xmlns:r="http://schemas.openxmlformats.org/officeDocument/2006/relationships" xmlns:p="http://schemas.openxmlformats.org/presentationml/2006/main">
-  <p:cSld>
-    <p:spTree>
-      <p:nvGrpSpPr>
-        <p:cNvPr id="1" name=""/>
-        <p:cNvGrpSpPr/>
-        <p:nvPr/>
-      </p:nvGrpSpPr>
-      <p:grpSpPr>
-        <a:xfrm>
-          <a:off x="0" y="0"/>
-          <a:ext cx="0" cy="0"/>
-          <a:chOff x="0" y="0"/>
-          <a:chExt cx="0" cy="0"/>
-        </a:xfrm>
-      </p:grpSpPr>
-      <p:sp>
-        <p:nvSpPr>
-          <p:cNvPr id="2" name="Title 1">
-            <a:extLst>
-              <a:ext uri="{FF2B5EF4-FFF2-40B4-BE49-F238E27FC236}">
-                <a16:creationId xmlns:a16="http://schemas.microsoft.com/office/drawing/2014/main" id="{4F7DCC97-7060-014A-8409-E0A169C7F431}"/>
-              </a:ext>
-            </a:extLst>
-          </p:cNvPr>
-          <p:cNvSpPr>
-            <a:spLocks noGrp="1"/>
-          </p:cNvSpPr>
-          <p:nvPr>
-            <p:ph type="title"/>
-          </p:nvPr>
-        </p:nvSpPr>
-        <p:spPr/>
-        <p:txBody>
-          <a:bodyPr/>
-          <a:lstStyle/>
-          <a:p>
-            <a:r>
-              <a:rPr lang="en-US"/>
-              <a:t>Maverick</a:t>
-            </a:r>
-          </a:p>
-        </p:txBody>
-      </p:sp>
-      <p:sp>
-        <p:nvSpPr>
-          <p:cNvPr id="3" name="Content Placeholder 2">
-            <a:extLst>
-              <a:ext uri="{FF2B5EF4-FFF2-40B4-BE49-F238E27FC236}">
-                <a16:creationId xmlns:a16="http://schemas.microsoft.com/office/drawing/2014/main" id="{03586B1A-F6CC-F341-B58E-C990DC298B24}"/>
-              </a:ext>
-            </a:extLst>
-          </p:cNvPr>
-          <p:cNvSpPr>
-            <a:spLocks noGrp="1"/>
-          </p:cNvSpPr>
-          <p:nvPr>
-            <p:ph idx="1"/>
-          </p:nvPr>
-        </p:nvSpPr>
-        <p:spPr/>
-        <p:txBody>
-          <a:bodyPr anchor="ctr"/>
-          <a:lstStyle/>
-          <a:p>
-            <a:pPr marL="0" indent="0" algn="ctr">
-              <a:buNone/>
-            </a:pPr>
-            <a:r>
-              <a:rPr lang="en-US"/>
-              <a:t>Where?</a:t>
-            </a:r>
-            <a:endParaRPr lang="en-US" dirty="0"/>
-          </a:p>
-        </p:txBody>
-      </p:sp>
-    </p:spTree>
-    <p:extLst>
-      <p:ext uri="{BB962C8B-B14F-4D97-AF65-F5344CB8AC3E}">
-        <p14:creationId xmlns:p14="http://schemas.microsoft.com/office/powerpoint/2010/main" val="2908220223"/>
-      </p:ext>
-    </p:extLst>
-  </p:cSld>
-  <p:clrMapOvr>
-    <a:masterClrMapping/>
-  </p:clrMapOvr>
-</p:sld>
-</file>
-
-<file path=ppt/slides/slide35.xml><?xml version="1.0" encoding="utf-8"?>
-<p:sld xmlns:a="http://schemas.openxmlformats.org/drawingml/2006/main" xmlns:r="http://schemas.openxmlformats.org/officeDocument/2006/relationships" xmlns:p="http://schemas.openxmlformats.org/presentationml/2006/main">
-  <p:cSld>
-    <p:spTree>
-      <p:nvGrpSpPr>
-        <p:cNvPr id="1" name=""/>
-        <p:cNvGrpSpPr/>
-        <p:nvPr/>
-      </p:nvGrpSpPr>
-      <p:grpSpPr>
-        <a:xfrm>
-          <a:off x="0" y="0"/>
-          <a:ext cx="0" cy="0"/>
-          <a:chOff x="0" y="0"/>
-          <a:chExt cx="0" cy="0"/>
-        </a:xfrm>
-      </p:grpSpPr>
-      <p:sp>
-        <p:nvSpPr>
-          <p:cNvPr id="2" name="Title 1">
-            <a:extLst>
-              <a:ext uri="{FF2B5EF4-FFF2-40B4-BE49-F238E27FC236}">
-                <a16:creationId xmlns:a16="http://schemas.microsoft.com/office/drawing/2014/main" id="{46524C6C-B9A6-D04F-A2C2-12133B901705}"/>
-              </a:ext>
-            </a:extLst>
-          </p:cNvPr>
-          <p:cNvSpPr>
-            <a:spLocks noGrp="1"/>
-          </p:cNvSpPr>
-          <p:nvPr>
-            <p:ph type="title"/>
-          </p:nvPr>
-        </p:nvSpPr>
-        <p:spPr/>
-        <p:txBody>
-          <a:bodyPr/>
-          <a:lstStyle/>
-          <a:p>
-            <a:r>
-              <a:rPr lang="en-US"/>
-              <a:t>Dr Dewey</a:t>
-            </a:r>
-          </a:p>
-        </p:txBody>
-      </p:sp>
-      <p:sp>
-        <p:nvSpPr>
-          <p:cNvPr id="3" name="Content Placeholder 2">
-            <a:extLst>
-              <a:ext uri="{FF2B5EF4-FFF2-40B4-BE49-F238E27FC236}">
-                <a16:creationId xmlns:a16="http://schemas.microsoft.com/office/drawing/2014/main" id="{48201A55-6E41-844B-A2B1-D84AA36C471E}"/>
-              </a:ext>
-            </a:extLst>
-          </p:cNvPr>
-          <p:cNvSpPr>
-            <a:spLocks noGrp="1"/>
-          </p:cNvSpPr>
-          <p:nvPr>
-            <p:ph idx="1"/>
-          </p:nvPr>
-        </p:nvSpPr>
-        <p:spPr/>
-        <p:txBody>
-          <a:bodyPr anchor="ctr"/>
-          <a:lstStyle/>
-          <a:p>
-            <a:pPr marL="0" indent="0" algn="ctr">
-              <a:buNone/>
-            </a:pPr>
-            <a:r>
-              <a:rPr lang="en-US"/>
-              <a:t>Why?</a:t>
-            </a:r>
-            <a:endParaRPr lang="en-US" dirty="0"/>
-          </a:p>
-        </p:txBody>
-      </p:sp>
-    </p:spTree>
-    <p:extLst>
-      <p:ext uri="{BB962C8B-B14F-4D97-AF65-F5344CB8AC3E}">
-        <p14:creationId xmlns:p14="http://schemas.microsoft.com/office/powerpoint/2010/main" val="3509253011"/>
-      </p:ext>
-    </p:extLst>
-  </p:cSld>
-  <p:clrMapOvr>
-    <a:masterClrMapping/>
-  </p:clrMapOvr>
-</p:sld>
-</file>
-
-<file path=ppt/slides/slide36.xml><?xml version="1.0" encoding="utf-8"?>
-<p:sld xmlns:a="http://schemas.openxmlformats.org/drawingml/2006/main" xmlns:r="http://schemas.openxmlformats.org/officeDocument/2006/relationships" xmlns:p="http://schemas.openxmlformats.org/presentationml/2006/main">
-  <p:cSld>
-    <p:spTree>
-      <p:nvGrpSpPr>
-        <p:cNvPr id="1" name=""/>
-        <p:cNvGrpSpPr/>
-        <p:nvPr/>
-      </p:nvGrpSpPr>
-      <p:grpSpPr>
-        <a:xfrm>
-          <a:off x="0" y="0"/>
-          <a:ext cx="0" cy="0"/>
-          <a:chOff x="0" y="0"/>
-          <a:chExt cx="0" cy="0"/>
-        </a:xfrm>
-      </p:grpSpPr>
-      <p:sp>
-        <p:nvSpPr>
-          <p:cNvPr id="2" name="Title 1">
-            <a:extLst>
-              <a:ext uri="{FF2B5EF4-FFF2-40B4-BE49-F238E27FC236}">
-                <a16:creationId xmlns:a16="http://schemas.microsoft.com/office/drawing/2014/main" id="{B000D857-AF7C-8247-BB19-62613B1DED31}"/>
-              </a:ext>
-            </a:extLst>
-          </p:cNvPr>
-          <p:cNvSpPr>
-            <a:spLocks noGrp="1"/>
-          </p:cNvSpPr>
-          <p:nvPr>
-            <p:ph type="title"/>
-          </p:nvPr>
-        </p:nvSpPr>
-        <p:spPr/>
-        <p:txBody>
-          <a:bodyPr/>
-          <a:lstStyle/>
-          <a:p>
-            <a:r>
-              <a:rPr lang="en-US"/>
-              <a:t>Nicole</a:t>
-            </a:r>
-          </a:p>
-        </p:txBody>
-      </p:sp>
-      <p:sp>
-        <p:nvSpPr>
-          <p:cNvPr id="3" name="Content Placeholder 2">
-            <a:extLst>
-              <a:ext uri="{FF2B5EF4-FFF2-40B4-BE49-F238E27FC236}">
-                <a16:creationId xmlns:a16="http://schemas.microsoft.com/office/drawing/2014/main" id="{2C5B8046-85B8-3942-A53B-977BE366940B}"/>
-              </a:ext>
-            </a:extLst>
-          </p:cNvPr>
-          <p:cNvSpPr>
-            <a:spLocks noGrp="1"/>
-          </p:cNvSpPr>
-          <p:nvPr>
-            <p:ph idx="1"/>
-          </p:nvPr>
-        </p:nvSpPr>
-        <p:spPr/>
-        <p:txBody>
-          <a:bodyPr anchor="ctr"/>
-          <a:lstStyle/>
-          <a:p>
-            <a:pPr marL="0" indent="0" algn="ctr">
-              <a:buNone/>
-            </a:pPr>
-            <a:r>
-              <a:rPr lang="en-US"/>
-              <a:t>How?</a:t>
-            </a:r>
-            <a:endParaRPr lang="en-US" dirty="0"/>
-          </a:p>
-        </p:txBody>
-      </p:sp>
-    </p:spTree>
-    <p:extLst>
-      <p:ext uri="{BB962C8B-B14F-4D97-AF65-F5344CB8AC3E}">
-        <p14:creationId xmlns:p14="http://schemas.microsoft.com/office/powerpoint/2010/main" val="1819842987"/>
-      </p:ext>
-    </p:extLst>
-  </p:cSld>
-  <p:clrMapOvr>
-    <a:masterClrMapping/>
-  </p:clrMapOvr>
-</p:sld>
-</file>
-
-<file path=ppt/slides/slide37.xml><?xml version="1.0" encoding="utf-8"?>
-<p:sld xmlns:a="http://schemas.openxmlformats.org/drawingml/2006/main" xmlns:r="http://schemas.openxmlformats.org/officeDocument/2006/relationships" xmlns:p="http://schemas.openxmlformats.org/presentationml/2006/main">
-  <p:cSld>
-    <p:spTree>
-      <p:nvGrpSpPr>
-        <p:cNvPr id="1" name=""/>
-        <p:cNvGrpSpPr/>
-        <p:nvPr/>
-      </p:nvGrpSpPr>
-      <p:grpSpPr>
-        <a:xfrm>
-          <a:off x="0" y="0"/>
-          <a:ext cx="0" cy="0"/>
-          <a:chOff x="0" y="0"/>
-          <a:chExt cx="0" cy="0"/>
-        </a:xfrm>
-      </p:grpSpPr>
-      <p:sp>
-        <p:nvSpPr>
-          <p:cNvPr id="2" name="Title 1">
-            <a:extLst>
-              <a:ext uri="{FF2B5EF4-FFF2-40B4-BE49-F238E27FC236}">
-                <a16:creationId xmlns:a16="http://schemas.microsoft.com/office/drawing/2014/main" id="{6A64EEBE-D5FF-E64A-8E1E-B3DBFCEA0002}"/>
-              </a:ext>
-            </a:extLst>
-          </p:cNvPr>
-          <p:cNvSpPr>
-            <a:spLocks noGrp="1"/>
-          </p:cNvSpPr>
-          <p:nvPr>
-            <p:ph type="title"/>
-          </p:nvPr>
-        </p:nvSpPr>
-        <p:spPr/>
-        <p:txBody>
-          <a:bodyPr/>
-          <a:lstStyle/>
-          <a:p>
-            <a:r>
-              <a:rPr lang="en-US"/>
-              <a:t>Jake</a:t>
-            </a:r>
-          </a:p>
-        </p:txBody>
-      </p:sp>
-      <p:sp>
-        <p:nvSpPr>
-          <p:cNvPr id="3" name="Content Placeholder 2">
-            <a:extLst>
-              <a:ext uri="{FF2B5EF4-FFF2-40B4-BE49-F238E27FC236}">
-                <a16:creationId xmlns:a16="http://schemas.microsoft.com/office/drawing/2014/main" id="{66ACBCFB-C03D-F04A-8841-6B8C442411CF}"/>
-              </a:ext>
-            </a:extLst>
-          </p:cNvPr>
-          <p:cNvSpPr>
-            <a:spLocks noGrp="1"/>
-          </p:cNvSpPr>
-          <p:nvPr>
-            <p:ph idx="1"/>
-          </p:nvPr>
-        </p:nvSpPr>
-        <p:spPr/>
-        <p:txBody>
-          <a:bodyPr/>
-          <a:lstStyle/>
-          <a:p>
-            <a:r>
-              <a:rPr lang="en-US"/>
-              <a:t>Can you find a number that does not follow this pattern?</a:t>
-            </a:r>
-          </a:p>
-          <a:p>
-            <a:pPr marL="571500" lvl="1" indent="-342900">
-              <a:buFont typeface="+mj-lt"/>
-              <a:buAutoNum type="arabicPeriod"/>
-            </a:pPr>
-            <a:r>
-              <a:rPr lang="en-US"/>
-              <a:t>If the number is even</a:t>
-            </a:r>
-            <a:r>
-              <a:rPr lang="en-US" dirty="0"/>
-              <a:t>,</a:t>
-            </a:r>
-            <a:r>
-              <a:rPr lang="en-US"/>
-              <a:t> divide it by two. </a:t>
-            </a:r>
-            <a:br>
-              <a:rPr lang="en-US" dirty="0"/>
-            </a:br>
-            <a:r>
-              <a:rPr lang="en-US"/>
-              <a:t>If it’s odd, divide by three and add one</a:t>
-            </a:r>
-          </a:p>
-          <a:p>
-            <a:pPr marL="571500" lvl="1" indent="-342900">
-              <a:buFont typeface="+mj-lt"/>
-              <a:buAutoNum type="arabicPeriod"/>
-            </a:pPr>
-            <a:r>
-              <a:rPr lang="en-US"/>
-              <a:t>Repeat step one with your new number until you reach one</a:t>
-            </a:r>
-          </a:p>
-        </p:txBody>
-      </p:sp>
-    </p:spTree>
-    <p:extLst>
-      <p:ext uri="{BB962C8B-B14F-4D97-AF65-F5344CB8AC3E}">
-        <p14:creationId xmlns:p14="http://schemas.microsoft.com/office/powerpoint/2010/main" val="2388182158"/>
-      </p:ext>
-    </p:extLst>
-  </p:cSld>
-  <p:clrMapOvr>
-    <a:masterClrMapping/>
-  </p:clrMapOvr>
-</p:sld>
-</file>
-
-<file path=ppt/slides/slide38.xml><?xml version="1.0" encoding="utf-8"?>
-<p:sld xmlns:a="http://schemas.openxmlformats.org/drawingml/2006/main" xmlns:r="http://schemas.openxmlformats.org/officeDocument/2006/relationships" xmlns:p="http://schemas.openxmlformats.org/presentationml/2006/main">
-  <p:cSld>
-    <p:bg>
-      <p:bgPr>
-        <a:solidFill>
-          <a:schemeClr val="accent2"/>
-        </a:solidFill>
-        <a:effectLst/>
-      </p:bgPr>
-    </p:bg>
-    <p:spTree>
-      <p:nvGrpSpPr>
-        <p:cNvPr id="1" name=""/>
-        <p:cNvGrpSpPr/>
-        <p:nvPr/>
-      </p:nvGrpSpPr>
-      <p:grpSpPr>
-        <a:xfrm>
-          <a:off x="0" y="0"/>
-          <a:ext cx="0" cy="0"/>
-          <a:chOff x="0" y="0"/>
-          <a:chExt cx="0" cy="0"/>
-        </a:xfrm>
-      </p:grpSpPr>
-      <p:sp>
-        <p:nvSpPr>
-          <p:cNvPr id="20" name="Rectangle 15">
-            <a:extLst>
-              <a:ext uri="{FF2B5EF4-FFF2-40B4-BE49-F238E27FC236}">
-                <a16:creationId xmlns:a16="http://schemas.microsoft.com/office/drawing/2014/main" id="{E642F1F7-6246-4C87-B941-6957B32BD001}"/>
-              </a:ext>
-              <a:ext uri="{C183D7F6-B498-43B3-948B-1728B52AA6E4}">
-                <adec:decorative xmlns:adec="http://schemas.microsoft.com/office/drawing/2017/decorative" val="1"/>
-              </a:ext>
-            </a:extLst>
-          </p:cNvPr>
-          <p:cNvSpPr>
-            <a:spLocks noGrp="1" noRot="1" noChangeAspect="1" noMove="1" noResize="1" noEditPoints="1" noAdjustHandles="1" noChangeArrowheads="1" noChangeShapeType="1" noTextEdit="1"/>
-          </p:cNvSpPr>
-          <p:nvPr>
-            <p:extLst>
-              <p:ext uri="{386F3935-93C4-4BCD-93E2-E3B085C9AB24}">
-                <p16:designElem xmlns:p16="http://schemas.microsoft.com/office/powerpoint/2015/main" val="1"/>
-              </p:ext>
-            </p:extLst>
-          </p:nvPr>
-        </p:nvSpPr>
-        <p:spPr>
-          <a:xfrm>
-            <a:off x="0" y="-2"/>
-            <a:ext cx="12192000" cy="4918511"/>
-          </a:xfrm>
-          <a:prstGeom prst="rect">
-            <a:avLst/>
-          </a:prstGeom>
-          <a:solidFill>
-            <a:srgbClr val="FFFFFF"/>
-          </a:solidFill>
-          <a:ln>
-            <a:noFill/>
-          </a:ln>
-        </p:spPr>
-        <p:style>
-          <a:lnRef idx="2">
-            <a:schemeClr val="accent1">
-              <a:shade val="50000"/>
-            </a:schemeClr>
-          </a:lnRef>
-          <a:fillRef idx="1">
-            <a:schemeClr val="accent1"/>
-          </a:fillRef>
-          <a:effectRef idx="0">
-            <a:schemeClr val="accent1"/>
-          </a:effectRef>
-          <a:fontRef idx="minor">
-            <a:schemeClr val="lt1"/>
-          </a:fontRef>
-        </p:style>
-        <p:txBody>
-          <a:bodyPr rtlCol="0" anchor="ctr"/>
-          <a:lstStyle/>
-          <a:p>
-            <a:pPr algn="ctr"/>
-            <a:endParaRPr lang="en-US"/>
-          </a:p>
-        </p:txBody>
-      </p:sp>
-      <p:sp>
-        <p:nvSpPr>
-          <p:cNvPr id="2" name="Title 1">
-            <a:extLst>
-              <a:ext uri="{FF2B5EF4-FFF2-40B4-BE49-F238E27FC236}">
-                <a16:creationId xmlns:a16="http://schemas.microsoft.com/office/drawing/2014/main" id="{4399A1FD-1C7A-F844-9729-24AC7247C315}"/>
-              </a:ext>
-            </a:extLst>
-          </p:cNvPr>
-          <p:cNvSpPr>
-            <a:spLocks noGrp="1"/>
-          </p:cNvSpPr>
-          <p:nvPr>
-            <p:ph type="title"/>
-          </p:nvPr>
-        </p:nvSpPr>
-        <p:spPr>
-          <a:xfrm>
-            <a:off x="1600200" y="4269282"/>
-            <a:ext cx="8991600" cy="1264762"/>
-          </a:xfrm>
-        </p:spPr>
-        <p:txBody>
-          <a:bodyPr vert="horz" lIns="274320" tIns="182880" rIns="274320" bIns="182880" rtlCol="0" anchor="ctr" anchorCtr="1">
-            <a:normAutofit fontScale="90000"/>
-          </a:bodyPr>
-          <a:lstStyle/>
-          <a:p>
-            <a:r>
-              <a:rPr lang="en-US" sz="6600" b="1"/>
-              <a:t>Hailey</a:t>
-            </a:r>
-          </a:p>
-        </p:txBody>
-      </p:sp>
-      <p:pic>
-        <p:nvPicPr>
-          <p:cNvPr id="5" name="Content Placeholder 4" descr="Man outline">
-            <a:extLst>
-              <a:ext uri="{FF2B5EF4-FFF2-40B4-BE49-F238E27FC236}">
-                <a16:creationId xmlns:a16="http://schemas.microsoft.com/office/drawing/2014/main" id="{23991C76-01E0-4B4D-8CD0-C045637F7004}"/>
-              </a:ext>
-            </a:extLst>
-          </p:cNvPr>
-          <p:cNvPicPr>
-            <a:picLocks noGrp="1" noChangeAspect="1"/>
-          </p:cNvPicPr>
-          <p:nvPr>
-            <p:ph idx="1"/>
-          </p:nvPr>
-        </p:nvPicPr>
-        <p:blipFill>
-          <a:blip r:embed="rId2">
-            <a:extLst>
-              <a:ext uri="{96DAC541-7B7A-43D3-8B79-37D633B846F1}">
-                <asvg:svgBlip xmlns:asvg="http://schemas.microsoft.com/office/drawing/2016/SVG/main" r:embed="rId3"/>
-              </a:ext>
-            </a:extLst>
-          </a:blip>
-          <a:stretch>
-            <a:fillRect/>
-          </a:stretch>
-        </p:blipFill>
-        <p:spPr>
-          <a:xfrm>
-            <a:off x="692912" y="948063"/>
-            <a:ext cx="2580894" cy="2580894"/>
-          </a:xfrm>
-          <a:prstGeom prst="rect">
-            <a:avLst/>
-          </a:prstGeom>
-        </p:spPr>
-      </p:pic>
-      <p:pic>
-        <p:nvPicPr>
-          <p:cNvPr id="7" name="Graphic 6" descr="Woman outline">
-            <a:extLst>
-              <a:ext uri="{FF2B5EF4-FFF2-40B4-BE49-F238E27FC236}">
-                <a16:creationId xmlns:a16="http://schemas.microsoft.com/office/drawing/2014/main" id="{DE27FAD6-B7AE-D948-8E3F-2D1CE2314947}"/>
-              </a:ext>
-            </a:extLst>
-          </p:cNvPr>
-          <p:cNvPicPr>
-            <a:picLocks noChangeAspect="1"/>
-          </p:cNvPicPr>
-          <p:nvPr/>
-        </p:nvPicPr>
-        <p:blipFill>
-          <a:blip r:embed="rId4">
-            <a:extLst>
-              <a:ext uri="{96DAC541-7B7A-43D3-8B79-37D633B846F1}">
-                <asvg:svgBlip xmlns:asvg="http://schemas.microsoft.com/office/drawing/2016/SVG/main" r:embed="rId5"/>
-              </a:ext>
-            </a:extLst>
-          </a:blip>
-          <a:stretch>
-            <a:fillRect/>
-          </a:stretch>
-        </p:blipFill>
-        <p:spPr>
-          <a:xfrm>
-            <a:off x="1793148" y="1306964"/>
-            <a:ext cx="2221992" cy="2221992"/>
-          </a:xfrm>
-          <a:prstGeom prst="rect">
-            <a:avLst/>
-          </a:prstGeom>
-        </p:spPr>
-      </p:pic>
-      <p:pic>
-        <p:nvPicPr>
-          <p:cNvPr id="9" name="Graphic 8" descr="Support Dog with solid fill">
-            <a:extLst>
-              <a:ext uri="{FF2B5EF4-FFF2-40B4-BE49-F238E27FC236}">
-                <a16:creationId xmlns:a16="http://schemas.microsoft.com/office/drawing/2014/main" id="{F358AE1B-3258-C14E-97DC-0C2AFDF76BB2}"/>
-              </a:ext>
-            </a:extLst>
-          </p:cNvPr>
-          <p:cNvPicPr>
-            <a:picLocks noChangeAspect="1"/>
-          </p:cNvPicPr>
-          <p:nvPr/>
-        </p:nvPicPr>
-        <p:blipFill>
-          <a:blip r:embed="rId6">
-            <a:extLst>
-              <a:ext uri="{96DAC541-7B7A-43D3-8B79-37D633B846F1}">
-                <asvg:svgBlip xmlns:asvg="http://schemas.microsoft.com/office/drawing/2016/SVG/main" r:embed="rId7"/>
-              </a:ext>
-            </a:extLst>
-          </a:blip>
-          <a:stretch>
-            <a:fillRect/>
-          </a:stretch>
-        </p:blipFill>
-        <p:spPr>
-          <a:xfrm>
-            <a:off x="2641600" y="2344616"/>
-            <a:ext cx="1422618" cy="1422618"/>
-          </a:xfrm>
-          <a:prstGeom prst="rect">
-            <a:avLst/>
-          </a:prstGeom>
-        </p:spPr>
-      </p:pic>
-      <p:pic>
-        <p:nvPicPr>
-          <p:cNvPr id="11" name="Graphic 10" descr="Flowers Bunch outline">
-            <a:extLst>
-              <a:ext uri="{FF2B5EF4-FFF2-40B4-BE49-F238E27FC236}">
-                <a16:creationId xmlns:a16="http://schemas.microsoft.com/office/drawing/2014/main" id="{F0FB9773-A67B-F24A-89C7-26839DB25C5C}"/>
-              </a:ext>
-            </a:extLst>
-          </p:cNvPr>
-          <p:cNvPicPr>
-            <a:picLocks noChangeAspect="1"/>
-          </p:cNvPicPr>
-          <p:nvPr/>
-        </p:nvPicPr>
-        <p:blipFill>
-          <a:blip r:embed="rId8">
-            <a:extLst>
-              <a:ext uri="{96DAC541-7B7A-43D3-8B79-37D633B846F1}">
-                <asvg:svgBlip xmlns:asvg="http://schemas.microsoft.com/office/drawing/2016/SVG/main" r:embed="rId9"/>
-              </a:ext>
-            </a:extLst>
-          </a:blip>
-          <a:stretch>
-            <a:fillRect/>
-          </a:stretch>
-        </p:blipFill>
-        <p:spPr>
-          <a:xfrm>
-            <a:off x="4805552" y="948061"/>
-            <a:ext cx="2580895" cy="2580895"/>
-          </a:xfrm>
-          <a:prstGeom prst="rect">
-            <a:avLst/>
-          </a:prstGeom>
-        </p:spPr>
-      </p:pic>
-      <p:sp>
-        <p:nvSpPr>
-          <p:cNvPr id="15" name="Rectangle 14">
-            <a:extLst>
-              <a:ext uri="{FF2B5EF4-FFF2-40B4-BE49-F238E27FC236}">
-                <a16:creationId xmlns:a16="http://schemas.microsoft.com/office/drawing/2014/main" id="{975BF1F9-EB25-3A49-97DF-08EDE6A8BBE9}"/>
-              </a:ext>
-            </a:extLst>
-          </p:cNvPr>
-          <p:cNvSpPr/>
-          <p:nvPr/>
-        </p:nvSpPr>
-        <p:spPr>
-          <a:xfrm>
-            <a:off x="8381999" y="1962150"/>
-            <a:ext cx="1838325" cy="1200150"/>
-          </a:xfrm>
-          <a:prstGeom prst="rect">
-            <a:avLst/>
-          </a:prstGeom>
-          <a:solidFill>
-            <a:schemeClr val="bg1"/>
-          </a:solidFill>
-          <a:ln>
-            <a:noFill/>
-          </a:ln>
-        </p:spPr>
-        <p:style>
-          <a:lnRef idx="2">
-            <a:schemeClr val="accent1">
-              <a:shade val="50000"/>
-            </a:schemeClr>
-          </a:lnRef>
-          <a:fillRef idx="1">
-            <a:schemeClr val="accent1"/>
-          </a:fillRef>
-          <a:effectRef idx="0">
-            <a:schemeClr val="accent1"/>
-          </a:effectRef>
-          <a:fontRef idx="minor">
-            <a:schemeClr val="lt1"/>
-          </a:fontRef>
-        </p:style>
-        <p:txBody>
-          <a:bodyPr rtlCol="0" anchor="ctr"/>
-          <a:lstStyle/>
-          <a:p>
-            <a:pPr algn="ctr"/>
-            <a:r>
-              <a:rPr lang="en-US" sz="4000" b="1">
-                <a:solidFill>
-                  <a:schemeClr val="tx1"/>
-                </a:solidFill>
-              </a:rPr>
-              <a:t>Date?</a:t>
-            </a:r>
-          </a:p>
-        </p:txBody>
-      </p:sp>
-      <p:pic>
-        <p:nvPicPr>
-          <p:cNvPr id="13" name="Graphic 12" descr="Flip calendar with solid fill">
-            <a:extLst>
-              <a:ext uri="{FF2B5EF4-FFF2-40B4-BE49-F238E27FC236}">
-                <a16:creationId xmlns:a16="http://schemas.microsoft.com/office/drawing/2014/main" id="{08A28199-5232-D84C-87DD-79BF0A2D2AF7}"/>
-              </a:ext>
-            </a:extLst>
-          </p:cNvPr>
-          <p:cNvPicPr>
-            <a:picLocks noChangeAspect="1"/>
-          </p:cNvPicPr>
-          <p:nvPr/>
-        </p:nvPicPr>
-        <p:blipFill>
-          <a:blip r:embed="rId10">
-            <a:extLst>
-              <a:ext uri="{96DAC541-7B7A-43D3-8B79-37D633B846F1}">
-                <asvg:svgBlip xmlns:asvg="http://schemas.microsoft.com/office/drawing/2016/SVG/main" r:embed="rId11"/>
-              </a:ext>
-            </a:extLst>
-          </a:blip>
-          <a:stretch>
-            <a:fillRect/>
-          </a:stretch>
-        </p:blipFill>
-        <p:spPr>
-          <a:xfrm>
-            <a:off x="8010907" y="948063"/>
-            <a:ext cx="2580893" cy="2580893"/>
-          </a:xfrm>
-          <a:prstGeom prst="rect">
-            <a:avLst/>
-          </a:prstGeom>
-        </p:spPr>
-      </p:pic>
-    </p:spTree>
-    <p:extLst>
-      <p:ext uri="{BB962C8B-B14F-4D97-AF65-F5344CB8AC3E}">
-        <p14:creationId xmlns:p14="http://schemas.microsoft.com/office/powerpoint/2010/main" val="1082147030"/>
-      </p:ext>
-    </p:extLst>
-  </p:cSld>
-  <p:clrMapOvr>
-    <a:masterClrMapping/>
-  </p:clrMapOvr>
-</p:sld>
-</file>
-
-<file path=ppt/slides/slide39.xml><?xml version="1.0" encoding="utf-8"?>
-<p:sld xmlns:a="http://schemas.openxmlformats.org/drawingml/2006/main" xmlns:r="http://schemas.openxmlformats.org/officeDocument/2006/relationships" xmlns:p="http://schemas.openxmlformats.org/presentationml/2006/main">
-  <p:cSld>
-    <p:bg>
-      <p:bgPr>
-        <a:solidFill>
-          <a:schemeClr val="bg1"/>
-        </a:solidFill>
-        <a:effectLst/>
-      </p:bgPr>
-    </p:bg>
-    <p:spTree>
-      <p:nvGrpSpPr>
-        <p:cNvPr id="1" name=""/>
-        <p:cNvGrpSpPr/>
-        <p:nvPr/>
-      </p:nvGrpSpPr>
-      <p:grpSpPr>
-        <a:xfrm>
-          <a:off x="0" y="0"/>
-          <a:ext cx="0" cy="0"/>
-          <a:chOff x="0" y="0"/>
-          <a:chExt cx="0" cy="0"/>
-        </a:xfrm>
-      </p:grpSpPr>
-      <p:sp>
-        <p:nvSpPr>
-          <p:cNvPr id="17" name="Rectangle 16">
-            <a:extLst>
-              <a:ext uri="{FF2B5EF4-FFF2-40B4-BE49-F238E27FC236}">
-                <a16:creationId xmlns:a16="http://schemas.microsoft.com/office/drawing/2014/main" id="{6D118E90-A8D1-41A8-B29B-06A3554D99BE}"/>
-              </a:ext>
-              <a:ext uri="{C183D7F6-B498-43B3-948B-1728B52AA6E4}">
-                <adec:decorative xmlns:adec="http://schemas.microsoft.com/office/drawing/2017/decorative" val="1"/>
-              </a:ext>
-            </a:extLst>
-          </p:cNvPr>
-          <p:cNvSpPr>
-            <a:spLocks noGrp="1" noRot="1" noChangeAspect="1" noMove="1" noResize="1" noEditPoints="1" noAdjustHandles="1" noChangeArrowheads="1" noChangeShapeType="1" noTextEdit="1"/>
-          </p:cNvSpPr>
-          <p:nvPr>
-            <p:extLst>
-              <p:ext uri="{386F3935-93C4-4BCD-93E2-E3B085C9AB24}">
-                <p16:designElem xmlns:p16="http://schemas.microsoft.com/office/powerpoint/2015/main" val="1"/>
-              </p:ext>
-            </p:extLst>
-          </p:nvPr>
-        </p:nvSpPr>
-        <p:spPr>
-          <a:xfrm>
-            <a:off x="0" y="-2"/>
-            <a:ext cx="12192000" cy="6858002"/>
-          </a:xfrm>
-          <a:prstGeom prst="rect">
-            <a:avLst/>
-          </a:prstGeom>
-          <a:solidFill>
-            <a:schemeClr val="accent2"/>
-          </a:solidFill>
-          <a:ln>
-            <a:noFill/>
-          </a:ln>
-        </p:spPr>
-        <p:style>
-          <a:lnRef idx="2">
-            <a:schemeClr val="accent1">
-              <a:shade val="50000"/>
-            </a:schemeClr>
-          </a:lnRef>
-          <a:fillRef idx="1">
-            <a:schemeClr val="accent1"/>
-          </a:fillRef>
-          <a:effectRef idx="0">
-            <a:schemeClr val="accent1"/>
-          </a:effectRef>
-          <a:fontRef idx="minor">
-            <a:schemeClr val="lt1"/>
-          </a:fontRef>
-        </p:style>
-        <p:txBody>
-          <a:bodyPr rtlCol="0" anchor="ctr"/>
-          <a:lstStyle/>
-          <a:p>
-            <a:pPr algn="ctr"/>
-            <a:endParaRPr lang="en-US"/>
-          </a:p>
-        </p:txBody>
-      </p:sp>
-      <p:sp>
-        <p:nvSpPr>
-          <p:cNvPr id="2" name="Title 1">
-            <a:extLst>
-              <a:ext uri="{FF2B5EF4-FFF2-40B4-BE49-F238E27FC236}">
-                <a16:creationId xmlns:a16="http://schemas.microsoft.com/office/drawing/2014/main" id="{263BE8A8-5E3B-AD4D-9D59-8ADC94B9B8F4}"/>
-              </a:ext>
-            </a:extLst>
-          </p:cNvPr>
-          <p:cNvSpPr>
-            <a:spLocks noGrp="1"/>
-          </p:cNvSpPr>
-          <p:nvPr>
-            <p:ph type="ctrTitle"/>
-          </p:nvPr>
-        </p:nvSpPr>
-        <p:spPr>
-          <a:xfrm>
-            <a:off x="1600200" y="4269282"/>
-            <a:ext cx="8991600" cy="1264762"/>
-          </a:xfrm>
-        </p:spPr>
-        <p:txBody>
-          <a:bodyPr>
-            <a:normAutofit/>
-          </a:bodyPr>
-          <a:lstStyle/>
-          <a:p>
-            <a:r>
-              <a:rPr lang="en-US" sz="3200"/>
               <a:t>Tutoring is bad</a:t>
             </a:r>
           </a:p>
@@ -16087,6 +14803,128 @@
           <p:cNvPr id="2" name="Title 1">
             <a:extLst>
               <a:ext uri="{FF2B5EF4-FFF2-40B4-BE49-F238E27FC236}">
+                <a16:creationId xmlns:a16="http://schemas.microsoft.com/office/drawing/2014/main" id="{24F3F4AC-D110-054B-92C8-BC40CD255A1C}"/>
+              </a:ext>
+            </a:extLst>
+          </p:cNvPr>
+          <p:cNvSpPr>
+            <a:spLocks noGrp="1"/>
+          </p:cNvSpPr>
+          <p:nvPr>
+            <p:ph type="title"/>
+          </p:nvPr>
+        </p:nvSpPr>
+        <p:spPr/>
+        <p:txBody>
+          <a:bodyPr/>
+          <a:lstStyle/>
+          <a:p>
+            <a:r>
+              <a:rPr lang="en-US" dirty="0"/>
+              <a:t>Root cause</a:t>
+            </a:r>
+          </a:p>
+        </p:txBody>
+      </p:sp>
+      <p:sp>
+        <p:nvSpPr>
+          <p:cNvPr id="3" name="Content Placeholder 2">
+            <a:extLst>
+              <a:ext uri="{FF2B5EF4-FFF2-40B4-BE49-F238E27FC236}">
+                <a16:creationId xmlns:a16="http://schemas.microsoft.com/office/drawing/2014/main" id="{DDD66808-B0C2-8A4A-9220-F38FDEE06739}"/>
+              </a:ext>
+            </a:extLst>
+          </p:cNvPr>
+          <p:cNvSpPr>
+            <a:spLocks noGrp="1"/>
+          </p:cNvSpPr>
+          <p:nvPr>
+            <p:ph idx="1"/>
+          </p:nvPr>
+        </p:nvSpPr>
+        <p:spPr/>
+        <p:txBody>
+          <a:bodyPr/>
+          <a:lstStyle/>
+          <a:p>
+            <a:pPr marL="0" indent="0">
+              <a:buNone/>
+            </a:pPr>
+            <a:r>
+              <a:rPr lang="en-US" dirty="0"/>
+              <a:t>Each department pays their own tutors</a:t>
+            </a:r>
+          </a:p>
+          <a:p>
+            <a:r>
+              <a:rPr lang="en-US" dirty="0"/>
+              <a:t>Each department is trying to maximize class coverage in their own department</a:t>
+            </a:r>
+          </a:p>
+          <a:p>
+            <a:r>
+              <a:rPr lang="en-US" dirty="0"/>
+              <a:t>Each department is trying to maximize the number of students that can attend tutoring</a:t>
+            </a:r>
+          </a:p>
+          <a:p>
+            <a:r>
+              <a:rPr lang="en-US" dirty="0"/>
+              <a:t>No department wants to pay for tutors for another department</a:t>
+            </a:r>
+          </a:p>
+          <a:p>
+            <a:endParaRPr lang="en-US" dirty="0"/>
+          </a:p>
+          <a:p>
+            <a:pPr marL="0" indent="0">
+              <a:buNone/>
+            </a:pPr>
+            <a:r>
+              <a:rPr lang="en-US" dirty="0"/>
+              <a:t>This is </a:t>
+            </a:r>
+          </a:p>
+          <a:p>
+            <a:endParaRPr lang="en-US" dirty="0"/>
+          </a:p>
+        </p:txBody>
+      </p:sp>
+    </p:spTree>
+    <p:extLst>
+      <p:ext uri="{BB962C8B-B14F-4D97-AF65-F5344CB8AC3E}">
+        <p14:creationId xmlns:p14="http://schemas.microsoft.com/office/powerpoint/2010/main" val="135030266"/>
+      </p:ext>
+    </p:extLst>
+  </p:cSld>
+  <p:clrMapOvr>
+    <a:masterClrMapping/>
+  </p:clrMapOvr>
+</p:sld>
+</file>
+
+<file path=ppt/slides/slide5.xml><?xml version="1.0" encoding="utf-8"?>
+<p:sld xmlns:a="http://schemas.openxmlformats.org/drawingml/2006/main" xmlns:r="http://schemas.openxmlformats.org/officeDocument/2006/relationships" xmlns:p="http://schemas.openxmlformats.org/presentationml/2006/main">
+  <p:cSld>
+    <p:spTree>
+      <p:nvGrpSpPr>
+        <p:cNvPr id="1" name=""/>
+        <p:cNvGrpSpPr/>
+        <p:nvPr/>
+      </p:nvGrpSpPr>
+      <p:grpSpPr>
+        <a:xfrm>
+          <a:off x="0" y="0"/>
+          <a:ext cx="0" cy="0"/>
+          <a:chOff x="0" y="0"/>
+          <a:chExt cx="0" cy="0"/>
+        </a:xfrm>
+      </p:grpSpPr>
+      <p:sp>
+        <p:nvSpPr>
+          <p:cNvPr id="2" name="Title 1">
+            <a:extLst>
+              <a:ext uri="{FF2B5EF4-FFF2-40B4-BE49-F238E27FC236}">
                 <a16:creationId xmlns:a16="http://schemas.microsoft.com/office/drawing/2014/main" id="{4CDFDBD1-C4B8-AE47-86C4-79AED31CB840}"/>
               </a:ext>
             </a:extLst>
@@ -16139,215 +14977,6 @@
     <p:extLst>
       <p:ext uri="{BB962C8B-B14F-4D97-AF65-F5344CB8AC3E}">
         <p14:creationId xmlns:p14="http://schemas.microsoft.com/office/powerpoint/2010/main" val="2392297922"/>
-      </p:ext>
-    </p:extLst>
-  </p:cSld>
-  <p:clrMapOvr>
-    <a:masterClrMapping/>
-  </p:clrMapOvr>
-</p:sld>
-</file>
-
-<file path=ppt/slides/slide5.xml><?xml version="1.0" encoding="utf-8"?>
-<p:sld xmlns:a="http://schemas.openxmlformats.org/drawingml/2006/main" xmlns:r="http://schemas.openxmlformats.org/officeDocument/2006/relationships" xmlns:p="http://schemas.openxmlformats.org/presentationml/2006/main">
-  <p:cSld>
-    <p:bg>
-      <p:bgPr>
-        <a:solidFill>
-          <a:schemeClr val="accent2"/>
-        </a:solidFill>
-        <a:effectLst/>
-      </p:bgPr>
-    </p:bg>
-    <p:spTree>
-      <p:nvGrpSpPr>
-        <p:cNvPr id="1" name=""/>
-        <p:cNvGrpSpPr/>
-        <p:nvPr/>
-      </p:nvGrpSpPr>
-      <p:grpSpPr>
-        <a:xfrm>
-          <a:off x="0" y="0"/>
-          <a:ext cx="0" cy="0"/>
-          <a:chOff x="0" y="0"/>
-          <a:chExt cx="0" cy="0"/>
-        </a:xfrm>
-      </p:grpSpPr>
-      <p:sp>
-        <p:nvSpPr>
-          <p:cNvPr id="19" name="Rectangle 18">
-            <a:extLst>
-              <a:ext uri="{FF2B5EF4-FFF2-40B4-BE49-F238E27FC236}">
-                <a16:creationId xmlns:a16="http://schemas.microsoft.com/office/drawing/2014/main" id="{E9F26AF7-9AC1-49A4-8F89-2C63E1C0A0BB}"/>
-              </a:ext>
-              <a:ext uri="{C183D7F6-B498-43B3-948B-1728B52AA6E4}">
-                <adec:decorative xmlns:adec="http://schemas.microsoft.com/office/drawing/2017/decorative" val="1"/>
-              </a:ext>
-            </a:extLst>
-          </p:cNvPr>
-          <p:cNvSpPr>
-            <a:spLocks noGrp="1" noRot="1" noChangeAspect="1" noMove="1" noResize="1" noEditPoints="1" noAdjustHandles="1" noChangeArrowheads="1" noChangeShapeType="1" noTextEdit="1"/>
-          </p:cNvSpPr>
-          <p:nvPr>
-            <p:extLst>
-              <p:ext uri="{386F3935-93C4-4BCD-93E2-E3B085C9AB24}">
-                <p16:designElem xmlns:p16="http://schemas.microsoft.com/office/powerpoint/2015/main" val="1"/>
-              </p:ext>
-            </p:extLst>
-          </p:nvPr>
-        </p:nvSpPr>
-        <p:spPr>
-          <a:xfrm>
-            <a:off x="0" y="-2"/>
-            <a:ext cx="12192000" cy="4918511"/>
-          </a:xfrm>
-          <a:prstGeom prst="rect">
-            <a:avLst/>
-          </a:prstGeom>
-          <a:solidFill>
-            <a:srgbClr val="FFFFFF"/>
-          </a:solidFill>
-          <a:ln>
-            <a:noFill/>
-          </a:ln>
-        </p:spPr>
-        <p:style>
-          <a:lnRef idx="2">
-            <a:schemeClr val="accent1">
-              <a:shade val="50000"/>
-            </a:schemeClr>
-          </a:lnRef>
-          <a:fillRef idx="1">
-            <a:schemeClr val="accent1"/>
-          </a:fillRef>
-          <a:effectRef idx="0">
-            <a:schemeClr val="accent1"/>
-          </a:effectRef>
-          <a:fontRef idx="minor">
-            <a:schemeClr val="lt1"/>
-          </a:fontRef>
-        </p:style>
-        <p:txBody>
-          <a:bodyPr rtlCol="0" anchor="ctr"/>
-          <a:lstStyle/>
-          <a:p>
-            <a:pPr algn="ctr"/>
-            <a:endParaRPr lang="en-US"/>
-          </a:p>
-        </p:txBody>
-      </p:sp>
-      <p:sp>
-        <p:nvSpPr>
-          <p:cNvPr id="2" name="Title 1">
-            <a:extLst>
-              <a:ext uri="{FF2B5EF4-FFF2-40B4-BE49-F238E27FC236}">
-                <a16:creationId xmlns:a16="http://schemas.microsoft.com/office/drawing/2014/main" id="{D16EEA7B-B04A-7E4C-A31A-11097DAFF2F2}"/>
-              </a:ext>
-            </a:extLst>
-          </p:cNvPr>
-          <p:cNvSpPr>
-            <a:spLocks noGrp="1"/>
-          </p:cNvSpPr>
-          <p:nvPr>
-            <p:ph type="title"/>
-          </p:nvPr>
-        </p:nvSpPr>
-        <p:spPr>
-          <a:xfrm>
-            <a:off x="1600200" y="4269282"/>
-            <a:ext cx="8991600" cy="1264762"/>
-          </a:xfrm>
-        </p:spPr>
-        <p:txBody>
-          <a:bodyPr vert="horz" lIns="274320" tIns="182880" rIns="274320" bIns="182880" rtlCol="0" anchor="ctr" anchorCtr="1">
-            <a:normAutofit/>
-          </a:bodyPr>
-          <a:lstStyle/>
-          <a:p>
-            <a:r>
-              <a:rPr lang="en-US" sz="3200"/>
-              <a:t>This is Gus taking stats 1</a:t>
-            </a:r>
-          </a:p>
-        </p:txBody>
-      </p:sp>
-      <p:pic>
-        <p:nvPicPr>
-          <p:cNvPr id="13" name="Graphic 12" descr="Crying face outline with solid fill">
-            <a:extLst>
-              <a:ext uri="{FF2B5EF4-FFF2-40B4-BE49-F238E27FC236}">
-                <a16:creationId xmlns:a16="http://schemas.microsoft.com/office/drawing/2014/main" id="{F658A221-0FFC-1C4F-90A0-669CDD0A7708}"/>
-              </a:ext>
-            </a:extLst>
-          </p:cNvPr>
-          <p:cNvPicPr>
-            <a:picLocks noChangeAspect="1"/>
-          </p:cNvPicPr>
-          <p:nvPr/>
-        </p:nvPicPr>
-        <p:blipFill>
-          <a:blip r:embed="rId2">
-            <a:extLst>
-              <a:ext uri="{96DAC541-7B7A-43D3-8B79-37D633B846F1}">
-                <asvg:svgBlip xmlns:asvg="http://schemas.microsoft.com/office/drawing/2016/SVG/main" r:embed="rId3"/>
-              </a:ext>
-            </a:extLst>
-          </a:blip>
-          <a:srcRect/>
-          <a:stretch/>
-        </p:blipFill>
-        <p:spPr>
-          <a:xfrm>
-            <a:off x="2794692" y="483987"/>
-            <a:ext cx="3301307" cy="3301307"/>
-          </a:xfrm>
-          <a:prstGeom prst="rect">
-            <a:avLst/>
-          </a:prstGeom>
-        </p:spPr>
-      </p:pic>
-      <p:pic>
-        <p:nvPicPr>
-          <p:cNvPr id="7" name="Content Placeholder 6" descr="Classroom with solid fill">
-            <a:extLst>
-              <a:ext uri="{FF2B5EF4-FFF2-40B4-BE49-F238E27FC236}">
-                <a16:creationId xmlns:a16="http://schemas.microsoft.com/office/drawing/2014/main" id="{ECD0ACE1-D6CC-BD4E-AA71-2E3B92E1C3C5}"/>
-              </a:ext>
-            </a:extLst>
-          </p:cNvPr>
-          <p:cNvPicPr>
-            <a:picLocks noGrp="1" noChangeAspect="1"/>
-          </p:cNvPicPr>
-          <p:nvPr>
-            <p:ph idx="1"/>
-          </p:nvPr>
-        </p:nvPicPr>
-        <p:blipFill>
-          <a:blip r:embed="rId4">
-            <a:extLst>
-              <a:ext uri="{96DAC541-7B7A-43D3-8B79-37D633B846F1}">
-                <asvg:svgBlip xmlns:asvg="http://schemas.microsoft.com/office/drawing/2016/SVG/main" r:embed="rId5"/>
-              </a:ext>
-            </a:extLst>
-          </a:blip>
-          <a:stretch>
-            <a:fillRect/>
-          </a:stretch>
-        </p:blipFill>
-        <p:spPr>
-          <a:xfrm>
-            <a:off x="6338315" y="587858"/>
-            <a:ext cx="3301307" cy="3301307"/>
-          </a:xfrm>
-          <a:prstGeom prst="rect">
-            <a:avLst/>
-          </a:prstGeom>
-        </p:spPr>
-      </p:pic>
-    </p:spTree>
-    <p:extLst>
-      <p:ext uri="{BB962C8B-B14F-4D97-AF65-F5344CB8AC3E}">
-        <p14:creationId xmlns:p14="http://schemas.microsoft.com/office/powerpoint/2010/main" val="4133848430"/>
       </p:ext>
     </p:extLst>
   </p:cSld>
@@ -16474,6 +15103,215 @@
           <a:lstStyle/>
           <a:p>
             <a:r>
+              <a:rPr lang="en-US" sz="3200"/>
+              <a:t>This is Gus taking stats 1</a:t>
+            </a:r>
+          </a:p>
+        </p:txBody>
+      </p:sp>
+      <p:pic>
+        <p:nvPicPr>
+          <p:cNvPr id="13" name="Graphic 12" descr="Crying face outline with solid fill">
+            <a:extLst>
+              <a:ext uri="{FF2B5EF4-FFF2-40B4-BE49-F238E27FC236}">
+                <a16:creationId xmlns:a16="http://schemas.microsoft.com/office/drawing/2014/main" id="{F658A221-0FFC-1C4F-90A0-669CDD0A7708}"/>
+              </a:ext>
+            </a:extLst>
+          </p:cNvPr>
+          <p:cNvPicPr>
+            <a:picLocks noChangeAspect="1"/>
+          </p:cNvPicPr>
+          <p:nvPr/>
+        </p:nvPicPr>
+        <p:blipFill>
+          <a:blip r:embed="rId2">
+            <a:extLst>
+              <a:ext uri="{96DAC541-7B7A-43D3-8B79-37D633B846F1}">
+                <asvg:svgBlip xmlns:asvg="http://schemas.microsoft.com/office/drawing/2016/SVG/main" r:embed="rId3"/>
+              </a:ext>
+            </a:extLst>
+          </a:blip>
+          <a:srcRect/>
+          <a:stretch/>
+        </p:blipFill>
+        <p:spPr>
+          <a:xfrm>
+            <a:off x="2794692" y="483987"/>
+            <a:ext cx="3301307" cy="3301307"/>
+          </a:xfrm>
+          <a:prstGeom prst="rect">
+            <a:avLst/>
+          </a:prstGeom>
+        </p:spPr>
+      </p:pic>
+      <p:pic>
+        <p:nvPicPr>
+          <p:cNvPr id="7" name="Content Placeholder 6" descr="Classroom with solid fill">
+            <a:extLst>
+              <a:ext uri="{FF2B5EF4-FFF2-40B4-BE49-F238E27FC236}">
+                <a16:creationId xmlns:a16="http://schemas.microsoft.com/office/drawing/2014/main" id="{ECD0ACE1-D6CC-BD4E-AA71-2E3B92E1C3C5}"/>
+              </a:ext>
+            </a:extLst>
+          </p:cNvPr>
+          <p:cNvPicPr>
+            <a:picLocks noGrp="1" noChangeAspect="1"/>
+          </p:cNvPicPr>
+          <p:nvPr>
+            <p:ph idx="1"/>
+          </p:nvPr>
+        </p:nvPicPr>
+        <p:blipFill>
+          <a:blip r:embed="rId4">
+            <a:extLst>
+              <a:ext uri="{96DAC541-7B7A-43D3-8B79-37D633B846F1}">
+                <asvg:svgBlip xmlns:asvg="http://schemas.microsoft.com/office/drawing/2016/SVG/main" r:embed="rId5"/>
+              </a:ext>
+            </a:extLst>
+          </a:blip>
+          <a:stretch>
+            <a:fillRect/>
+          </a:stretch>
+        </p:blipFill>
+        <p:spPr>
+          <a:xfrm>
+            <a:off x="6338315" y="587858"/>
+            <a:ext cx="3301307" cy="3301307"/>
+          </a:xfrm>
+          <a:prstGeom prst="rect">
+            <a:avLst/>
+          </a:prstGeom>
+        </p:spPr>
+      </p:pic>
+    </p:spTree>
+    <p:extLst>
+      <p:ext uri="{BB962C8B-B14F-4D97-AF65-F5344CB8AC3E}">
+        <p14:creationId xmlns:p14="http://schemas.microsoft.com/office/powerpoint/2010/main" val="4133848430"/>
+      </p:ext>
+    </p:extLst>
+  </p:cSld>
+  <p:clrMapOvr>
+    <a:masterClrMapping/>
+  </p:clrMapOvr>
+</p:sld>
+</file>
+
+<file path=ppt/slides/slide7.xml><?xml version="1.0" encoding="utf-8"?>
+<p:sld xmlns:a="http://schemas.openxmlformats.org/drawingml/2006/main" xmlns:r="http://schemas.openxmlformats.org/officeDocument/2006/relationships" xmlns:p="http://schemas.openxmlformats.org/presentationml/2006/main">
+  <p:cSld>
+    <p:bg>
+      <p:bgPr>
+        <a:solidFill>
+          <a:schemeClr val="accent2"/>
+        </a:solidFill>
+        <a:effectLst/>
+      </p:bgPr>
+    </p:bg>
+    <p:spTree>
+      <p:nvGrpSpPr>
+        <p:cNvPr id="1" name=""/>
+        <p:cNvGrpSpPr/>
+        <p:nvPr/>
+      </p:nvGrpSpPr>
+      <p:grpSpPr>
+        <a:xfrm>
+          <a:off x="0" y="0"/>
+          <a:ext cx="0" cy="0"/>
+          <a:chOff x="0" y="0"/>
+          <a:chExt cx="0" cy="0"/>
+        </a:xfrm>
+      </p:grpSpPr>
+      <p:sp>
+        <p:nvSpPr>
+          <p:cNvPr id="19" name="Rectangle 18">
+            <a:extLst>
+              <a:ext uri="{FF2B5EF4-FFF2-40B4-BE49-F238E27FC236}">
+                <a16:creationId xmlns:a16="http://schemas.microsoft.com/office/drawing/2014/main" id="{E9F26AF7-9AC1-49A4-8F89-2C63E1C0A0BB}"/>
+              </a:ext>
+              <a:ext uri="{C183D7F6-B498-43B3-948B-1728B52AA6E4}">
+                <adec:decorative xmlns:adec="http://schemas.microsoft.com/office/drawing/2017/decorative" val="1"/>
+              </a:ext>
+            </a:extLst>
+          </p:cNvPr>
+          <p:cNvSpPr>
+            <a:spLocks noGrp="1" noRot="1" noChangeAspect="1" noMove="1" noResize="1" noEditPoints="1" noAdjustHandles="1" noChangeArrowheads="1" noChangeShapeType="1" noTextEdit="1"/>
+          </p:cNvSpPr>
+          <p:nvPr>
+            <p:extLst>
+              <p:ext uri="{386F3935-93C4-4BCD-93E2-E3B085C9AB24}">
+                <p16:designElem xmlns:p16="http://schemas.microsoft.com/office/powerpoint/2015/main" val="1"/>
+              </p:ext>
+            </p:extLst>
+          </p:nvPr>
+        </p:nvSpPr>
+        <p:spPr>
+          <a:xfrm>
+            <a:off x="0" y="-2"/>
+            <a:ext cx="12192000" cy="4918511"/>
+          </a:xfrm>
+          <a:prstGeom prst="rect">
+            <a:avLst/>
+          </a:prstGeom>
+          <a:solidFill>
+            <a:srgbClr val="FFFFFF"/>
+          </a:solidFill>
+          <a:ln>
+            <a:noFill/>
+          </a:ln>
+        </p:spPr>
+        <p:style>
+          <a:lnRef idx="2">
+            <a:schemeClr val="accent1">
+              <a:shade val="50000"/>
+            </a:schemeClr>
+          </a:lnRef>
+          <a:fillRef idx="1">
+            <a:schemeClr val="accent1"/>
+          </a:fillRef>
+          <a:effectRef idx="0">
+            <a:schemeClr val="accent1"/>
+          </a:effectRef>
+          <a:fontRef idx="minor">
+            <a:schemeClr val="lt1"/>
+          </a:fontRef>
+        </p:style>
+        <p:txBody>
+          <a:bodyPr rtlCol="0" anchor="ctr"/>
+          <a:lstStyle/>
+          <a:p>
+            <a:pPr algn="ctr"/>
+            <a:endParaRPr lang="en-US"/>
+          </a:p>
+        </p:txBody>
+      </p:sp>
+      <p:sp>
+        <p:nvSpPr>
+          <p:cNvPr id="2" name="Title 1">
+            <a:extLst>
+              <a:ext uri="{FF2B5EF4-FFF2-40B4-BE49-F238E27FC236}">
+                <a16:creationId xmlns:a16="http://schemas.microsoft.com/office/drawing/2014/main" id="{D16EEA7B-B04A-7E4C-A31A-11097DAFF2F2}"/>
+              </a:ext>
+            </a:extLst>
+          </p:cNvPr>
+          <p:cNvSpPr>
+            <a:spLocks noGrp="1"/>
+          </p:cNvSpPr>
+          <p:nvPr>
+            <p:ph type="title"/>
+          </p:nvPr>
+        </p:nvSpPr>
+        <p:spPr>
+          <a:xfrm>
+            <a:off x="1600200" y="4269282"/>
+            <a:ext cx="8991600" cy="1264762"/>
+          </a:xfrm>
+        </p:spPr>
+        <p:txBody>
+          <a:bodyPr vert="horz" lIns="274320" tIns="182880" rIns="274320" bIns="182880" rtlCol="0" anchor="ctr" anchorCtr="1">
+            <a:normAutofit/>
+          </a:bodyPr>
+          <a:lstStyle/>
+          <a:p>
+            <a:r>
               <a:rPr lang="en-US" sz="3200" dirty="0"/>
               <a:t>This is Gus one week </a:t>
             </a:r>
@@ -16572,7 +15410,7 @@
 </p:sld>
 </file>
 
-<file path=ppt/slides/slide7.xml><?xml version="1.0" encoding="utf-8"?>
+<file path=ppt/slides/slide8.xml><?xml version="1.0" encoding="utf-8"?>
 <p:sld xmlns:a="http://schemas.openxmlformats.org/drawingml/2006/main" xmlns:r="http://schemas.openxmlformats.org/officeDocument/2006/relationships" xmlns:p="http://schemas.openxmlformats.org/presentationml/2006/main">
   <p:cSld>
     <p:bg>
@@ -17875,7 +16713,7 @@
 </p:sld>
 </file>
 
-<file path=ppt/slides/slide8.xml><?xml version="1.0" encoding="utf-8"?>
+<file path=ppt/slides/slide9.xml><?xml version="1.0" encoding="utf-8"?>
 <p:sld xmlns:a="http://schemas.openxmlformats.org/drawingml/2006/main" xmlns:r="http://schemas.openxmlformats.org/officeDocument/2006/relationships" xmlns:p="http://schemas.openxmlformats.org/presentationml/2006/main">
   <p:cSld>
     <p:bg>
@@ -18071,214 +16909,6 @@
     <p:extLst>
       <p:ext uri="{BB962C8B-B14F-4D97-AF65-F5344CB8AC3E}">
         <p14:creationId xmlns:p14="http://schemas.microsoft.com/office/powerpoint/2010/main" val="1097726419"/>
-      </p:ext>
-    </p:extLst>
-  </p:cSld>
-  <p:clrMapOvr>
-    <a:masterClrMapping/>
-  </p:clrMapOvr>
-</p:sld>
-</file>
-
-<file path=ppt/slides/slide9.xml><?xml version="1.0" encoding="utf-8"?>
-<p:sld xmlns:a="http://schemas.openxmlformats.org/drawingml/2006/main" xmlns:r="http://schemas.openxmlformats.org/officeDocument/2006/relationships" xmlns:p="http://schemas.openxmlformats.org/presentationml/2006/main">
-  <p:cSld>
-    <p:bg>
-      <p:bgPr>
-        <a:solidFill>
-          <a:schemeClr val="accent2"/>
-        </a:solidFill>
-        <a:effectLst/>
-      </p:bgPr>
-    </p:bg>
-    <p:spTree>
-      <p:nvGrpSpPr>
-        <p:cNvPr id="1" name=""/>
-        <p:cNvGrpSpPr/>
-        <p:nvPr/>
-      </p:nvGrpSpPr>
-      <p:grpSpPr>
-        <a:xfrm>
-          <a:off x="0" y="0"/>
-          <a:ext cx="0" cy="0"/>
-          <a:chOff x="0" y="0"/>
-          <a:chExt cx="0" cy="0"/>
-        </a:xfrm>
-      </p:grpSpPr>
-      <p:sp>
-        <p:nvSpPr>
-          <p:cNvPr id="19" name="Rectangle 18">
-            <a:extLst>
-              <a:ext uri="{FF2B5EF4-FFF2-40B4-BE49-F238E27FC236}">
-                <a16:creationId xmlns:a16="http://schemas.microsoft.com/office/drawing/2014/main" id="{E9F26AF7-9AC1-49A4-8F89-2C63E1C0A0BB}"/>
-              </a:ext>
-              <a:ext uri="{C183D7F6-B498-43B3-948B-1728B52AA6E4}">
-                <adec:decorative xmlns:adec="http://schemas.microsoft.com/office/drawing/2017/decorative" val="1"/>
-              </a:ext>
-            </a:extLst>
-          </p:cNvPr>
-          <p:cNvSpPr>
-            <a:spLocks noGrp="1" noRot="1" noChangeAspect="1" noMove="1" noResize="1" noEditPoints="1" noAdjustHandles="1" noChangeArrowheads="1" noChangeShapeType="1" noTextEdit="1"/>
-          </p:cNvSpPr>
-          <p:nvPr>
-            <p:extLst>
-              <p:ext uri="{386F3935-93C4-4BCD-93E2-E3B085C9AB24}">
-                <p16:designElem xmlns:p16="http://schemas.microsoft.com/office/powerpoint/2015/main" val="1"/>
-              </p:ext>
-            </p:extLst>
-          </p:nvPr>
-        </p:nvSpPr>
-        <p:spPr>
-          <a:xfrm>
-            <a:off x="0" y="-2"/>
-            <a:ext cx="12192000" cy="4918511"/>
-          </a:xfrm>
-          <a:prstGeom prst="rect">
-            <a:avLst/>
-          </a:prstGeom>
-          <a:solidFill>
-            <a:srgbClr val="FFFFFF"/>
-          </a:solidFill>
-          <a:ln>
-            <a:noFill/>
-          </a:ln>
-        </p:spPr>
-        <p:style>
-          <a:lnRef idx="2">
-            <a:schemeClr val="accent1">
-              <a:shade val="50000"/>
-            </a:schemeClr>
-          </a:lnRef>
-          <a:fillRef idx="1">
-            <a:schemeClr val="accent1"/>
-          </a:fillRef>
-          <a:effectRef idx="0">
-            <a:schemeClr val="accent1"/>
-          </a:effectRef>
-          <a:fontRef idx="minor">
-            <a:schemeClr val="lt1"/>
-          </a:fontRef>
-        </p:style>
-        <p:txBody>
-          <a:bodyPr rtlCol="0" anchor="ctr"/>
-          <a:lstStyle/>
-          <a:p>
-            <a:pPr algn="ctr"/>
-            <a:endParaRPr lang="en-US"/>
-          </a:p>
-        </p:txBody>
-      </p:sp>
-      <p:sp>
-        <p:nvSpPr>
-          <p:cNvPr id="2" name="Title 1">
-            <a:extLst>
-              <a:ext uri="{FF2B5EF4-FFF2-40B4-BE49-F238E27FC236}">
-                <a16:creationId xmlns:a16="http://schemas.microsoft.com/office/drawing/2014/main" id="{D16EEA7B-B04A-7E4C-A31A-11097DAFF2F2}"/>
-              </a:ext>
-            </a:extLst>
-          </p:cNvPr>
-          <p:cNvSpPr>
-            <a:spLocks noGrp="1"/>
-          </p:cNvSpPr>
-          <p:nvPr>
-            <p:ph type="title"/>
-          </p:nvPr>
-        </p:nvSpPr>
-        <p:spPr>
-          <a:xfrm>
-            <a:off x="1600200" y="4269282"/>
-            <a:ext cx="8991600" cy="1264762"/>
-          </a:xfrm>
-        </p:spPr>
-        <p:txBody>
-          <a:bodyPr vert="horz" lIns="274320" tIns="182880" rIns="274320" bIns="182880" rtlCol="0" anchor="ctr" anchorCtr="1">
-            <a:normAutofit/>
-          </a:bodyPr>
-          <a:lstStyle/>
-          <a:p>
-            <a:r>
-              <a:rPr lang="en-US" sz="3200"/>
-              <a:t>This is Gus taking a crash course in stats 1 from dr bunn</a:t>
-            </a:r>
-          </a:p>
-        </p:txBody>
-      </p:sp>
-      <p:pic>
-        <p:nvPicPr>
-          <p:cNvPr id="13" name="Graphic 12" descr="Crying face outline with solid fill">
-            <a:extLst>
-              <a:ext uri="{FF2B5EF4-FFF2-40B4-BE49-F238E27FC236}">
-                <a16:creationId xmlns:a16="http://schemas.microsoft.com/office/drawing/2014/main" id="{F658A221-0FFC-1C4F-90A0-669CDD0A7708}"/>
-              </a:ext>
-            </a:extLst>
-          </p:cNvPr>
-          <p:cNvPicPr>
-            <a:picLocks noChangeAspect="1"/>
-          </p:cNvPicPr>
-          <p:nvPr/>
-        </p:nvPicPr>
-        <p:blipFill>
-          <a:blip r:embed="rId2">
-            <a:extLst>
-              <a:ext uri="{96DAC541-7B7A-43D3-8B79-37D633B846F1}">
-                <asvg:svgBlip xmlns:asvg="http://schemas.microsoft.com/office/drawing/2016/SVG/main" r:embed="rId3"/>
-              </a:ext>
-            </a:extLst>
-          </a:blip>
-          <a:srcRect/>
-          <a:stretch/>
-        </p:blipFill>
-        <p:spPr>
-          <a:xfrm>
-            <a:off x="2794692" y="483987"/>
-            <a:ext cx="3301307" cy="3301307"/>
-          </a:xfrm>
-          <a:prstGeom prst="rect">
-            <a:avLst/>
-          </a:prstGeom>
-        </p:spPr>
-      </p:pic>
-      <p:pic>
-        <p:nvPicPr>
-          <p:cNvPr id="7" name="Content Placeholder 6" descr="Teacher with solid fill">
-            <a:extLst>
-              <a:ext uri="{FF2B5EF4-FFF2-40B4-BE49-F238E27FC236}">
-                <a16:creationId xmlns:a16="http://schemas.microsoft.com/office/drawing/2014/main" id="{ECD0ACE1-D6CC-BD4E-AA71-2E3B92E1C3C5}"/>
-              </a:ext>
-            </a:extLst>
-          </p:cNvPr>
-          <p:cNvPicPr>
-            <a:picLocks noGrp="1" noChangeAspect="1"/>
-          </p:cNvPicPr>
-          <p:nvPr>
-            <p:ph idx="1"/>
-          </p:nvPr>
-        </p:nvPicPr>
-        <p:blipFill>
-          <a:blip r:embed="rId4">
-            <a:extLst>
-              <a:ext uri="{96DAC541-7B7A-43D3-8B79-37D633B846F1}">
-                <asvg:svgBlip xmlns:asvg="http://schemas.microsoft.com/office/drawing/2016/SVG/main" r:embed="rId5"/>
-              </a:ext>
-            </a:extLst>
-          </a:blip>
-          <a:srcRect/>
-          <a:stretch/>
-        </p:blipFill>
-        <p:spPr>
-          <a:xfrm>
-            <a:off x="6338315" y="587858"/>
-            <a:ext cx="3301307" cy="3301307"/>
-          </a:xfrm>
-          <a:prstGeom prst="rect">
-            <a:avLst/>
-          </a:prstGeom>
-        </p:spPr>
-      </p:pic>
-    </p:spTree>
-    <p:extLst>
-      <p:ext uri="{BB962C8B-B14F-4D97-AF65-F5344CB8AC3E}">
-        <p14:creationId xmlns:p14="http://schemas.microsoft.com/office/powerpoint/2010/main" val="1071330444"/>
       </p:ext>
     </p:extLst>
   </p:cSld>

</xml_diff>

<commit_message>
Fixed an unfinished sentence
</commit_message>
<xml_diff>
--- a/ECO 3930 ~ Contemporary Economics/Final Paper/FinalPaper.pptx
+++ b/ECO 3930 ~ Contemporary Economics/Final Paper/FinalPaper.pptx
@@ -7490,7 +7490,7 @@
             <a:fld id="{9334D819-9F07-4261-B09B-9E467E5D9002}" type="datetimeFigureOut">
               <a:rPr lang="en-US" smtClean="0"/>
               <a:pPr/>
-              <a:t>12/21/21</a:t>
+              <a:t>12/31/21</a:t>
             </a:fld>
             <a:endParaRPr lang="en-US"/>
           </a:p>
@@ -7659,7 +7659,7 @@
           <a:p>
             <a:fld id="{9334D819-9F07-4261-B09B-9E467E5D9002}" type="datetimeFigureOut">
               <a:rPr lang="en-US" smtClean="0"/>
-              <a:t>12/21/21</a:t>
+              <a:t>12/31/21</a:t>
             </a:fld>
             <a:endParaRPr lang="en-US"/>
           </a:p>
@@ -7837,7 +7837,7 @@
           <a:p>
             <a:fld id="{9334D819-9F07-4261-B09B-9E467E5D9002}" type="datetimeFigureOut">
               <a:rPr lang="en-US" smtClean="0"/>
-              <a:t>12/21/21</a:t>
+              <a:t>12/31/21</a:t>
             </a:fld>
             <a:endParaRPr lang="en-US"/>
           </a:p>
@@ -8005,7 +8005,7 @@
           <a:p>
             <a:fld id="{9334D819-9F07-4261-B09B-9E467E5D9002}" type="datetimeFigureOut">
               <a:rPr lang="en-US" smtClean="0"/>
-              <a:t>12/21/21</a:t>
+              <a:t>12/31/21</a:t>
             </a:fld>
             <a:endParaRPr lang="en-US"/>
           </a:p>
@@ -8273,7 +8273,7 @@
             <a:fld id="{9334D819-9F07-4261-B09B-9E467E5D9002}" type="datetimeFigureOut">
               <a:rPr lang="en-US" smtClean="0"/>
               <a:pPr/>
-              <a:t>12/21/21</a:t>
+              <a:t>12/31/21</a:t>
             </a:fld>
             <a:endParaRPr lang="en-US"/>
           </a:p>
@@ -8503,7 +8503,7 @@
           <a:p>
             <a:fld id="{9334D819-9F07-4261-B09B-9E467E5D9002}" type="datetimeFigureOut">
               <a:rPr lang="en-US" smtClean="0"/>
-              <a:t>12/21/21</a:t>
+              <a:t>12/31/21</a:t>
             </a:fld>
             <a:endParaRPr lang="en-US"/>
           </a:p>
@@ -8866,7 +8866,7 @@
             <a:fld id="{9334D819-9F07-4261-B09B-9E467E5D9002}" type="datetimeFigureOut">
               <a:rPr lang="en-US" smtClean="0"/>
               <a:pPr/>
-              <a:t>12/21/21</a:t>
+              <a:t>12/31/21</a:t>
             </a:fld>
             <a:endParaRPr lang="en-US"/>
           </a:p>
@@ -9006,7 +9006,7 @@
           <a:p>
             <a:fld id="{9334D819-9F07-4261-B09B-9E467E5D9002}" type="datetimeFigureOut">
               <a:rPr lang="en-US" smtClean="0"/>
-              <a:t>12/21/21</a:t>
+              <a:t>12/31/21</a:t>
             </a:fld>
             <a:endParaRPr lang="en-US"/>
           </a:p>
@@ -9101,7 +9101,7 @@
           <a:p>
             <a:fld id="{9334D819-9F07-4261-B09B-9E467E5D9002}" type="datetimeFigureOut">
               <a:rPr lang="en-US" smtClean="0"/>
-              <a:t>12/21/21</a:t>
+              <a:t>12/31/21</a:t>
             </a:fld>
             <a:endParaRPr lang="en-US"/>
           </a:p>
@@ -9456,7 +9456,7 @@
           <a:p>
             <a:fld id="{9334D819-9F07-4261-B09B-9E467E5D9002}" type="datetimeFigureOut">
               <a:rPr lang="en-US" smtClean="0"/>
-              <a:t>12/21/21</a:t>
+              <a:t>12/31/21</a:t>
             </a:fld>
             <a:endParaRPr lang="en-US"/>
           </a:p>
@@ -9816,7 +9816,7 @@
           <a:p>
             <a:fld id="{9334D819-9F07-4261-B09B-9E467E5D9002}" type="datetimeFigureOut">
               <a:rPr lang="en-US" smtClean="0"/>
-              <a:t>12/21/21</a:t>
+              <a:t>12/31/21</a:t>
             </a:fld>
             <a:endParaRPr lang="en-US"/>
           </a:p>
@@ -10057,7 +10057,7 @@
             <a:fld id="{9334D819-9F07-4261-B09B-9E467E5D9002}" type="datetimeFigureOut">
               <a:rPr lang="en-US" smtClean="0"/>
               <a:pPr/>
-              <a:t>12/21/21</a:t>
+              <a:t>12/31/21</a:t>
             </a:fld>
             <a:endParaRPr lang="en-US"/>
           </a:p>
@@ -14870,22 +14870,12 @@
           <a:p>
             <a:r>
               <a:rPr lang="en-US" dirty="0"/>
-              <a:t>No department wants to pay for tutors for another department</a:t>
+              <a:t>No department wants to pay for tutors for </a:t>
             </a:r>
-          </a:p>
-          <a:p>
-            <a:endParaRPr lang="en-US" dirty="0"/>
-          </a:p>
-          <a:p>
-            <a:pPr marL="0" indent="0">
-              <a:buNone/>
-            </a:pPr>
             <a:r>
-              <a:rPr lang="en-US" dirty="0"/>
-              <a:t>This is </a:t>
+              <a:rPr lang="en-US"/>
+              <a:t>another department</a:t>
             </a:r>
-          </a:p>
-          <a:p>
             <a:endParaRPr lang="en-US" dirty="0"/>
           </a:p>
         </p:txBody>

</xml_diff>